<commit_message>
slides for pta, ffnn
</commit_message>
<xml_diff>
--- a/slides/backpropagation.pptx
+++ b/slides/backpropagation.pptx
@@ -34,6 +34,16 @@
     <p:sldId id="281" r:id="rId28"/>
     <p:sldId id="282" r:id="rId29"/>
     <p:sldId id="284" r:id="rId30"/>
+    <p:sldId id="289" r:id="rId31"/>
+    <p:sldId id="290" r:id="rId32"/>
+    <p:sldId id="291" r:id="rId33"/>
+    <p:sldId id="292" r:id="rId34"/>
+    <p:sldId id="293" r:id="rId35"/>
+    <p:sldId id="294" r:id="rId36"/>
+    <p:sldId id="295" r:id="rId37"/>
+    <p:sldId id="296" r:id="rId38"/>
+    <p:sldId id="297" r:id="rId39"/>
+    <p:sldId id="298" r:id="rId40"/>
   </p:sldIdLst>
   <p:sldSz cx="9144000" cy="6858000" type="screen4x3"/>
   <p:notesSz cx="6858000" cy="9144000"/>
@@ -135,6 +145,2313 @@
 </p:presentation>
 </file>
 
+<file path=ppt/charts/chart1.xml><?xml version="1.0" encoding="utf-8"?>
+<c:chartSpace xmlns:c="http://schemas.openxmlformats.org/drawingml/2006/chart" xmlns:a="http://schemas.openxmlformats.org/drawingml/2006/main" xmlns:r="http://schemas.openxmlformats.org/officeDocument/2006/relationships">
+  <c:date1904 val="0"/>
+  <c:lang val="en-IN"/>
+  <c:roundedCorners val="0"/>
+  <mc:AlternateContent xmlns:mc="http://schemas.openxmlformats.org/markup-compatibility/2006">
+    <mc:Choice xmlns:c14="http://schemas.microsoft.com/office/drawing/2007/8/2/chart" Requires="c14">
+      <c14:style val="102"/>
+    </mc:Choice>
+    <mc:Fallback>
+      <c:style val="2"/>
+    </mc:Fallback>
+  </mc:AlternateContent>
+  <c:chart>
+    <c:autoTitleDeleted val="0"/>
+    <c:plotArea>
+      <c:layout/>
+      <c:lineChart>
+        <c:grouping val="standard"/>
+        <c:varyColors val="0"/>
+        <c:ser>
+          <c:idx val="0"/>
+          <c:order val="0"/>
+          <c:tx>
+            <c:strRef>
+              <c:f>Sheet1!$B$1</c:f>
+              <c:strCache>
+                <c:ptCount val="1"/>
+                <c:pt idx="0">
+                  <c:v>Set 1</c:v>
+                </c:pt>
+              </c:strCache>
+            </c:strRef>
+          </c:tx>
+          <c:marker>
+            <c:symbol val="none"/>
+          </c:marker>
+          <c:cat>
+            <c:numRef>
+              <c:f>Sheet1!$A$2:$A$46</c:f>
+              <c:numCache>
+                <c:formatCode>General</c:formatCode>
+                <c:ptCount val="45"/>
+                <c:pt idx="0">
+                  <c:v>1</c:v>
+                </c:pt>
+                <c:pt idx="1">
+                  <c:v>2</c:v>
+                </c:pt>
+                <c:pt idx="2">
+                  <c:v>3</c:v>
+                </c:pt>
+                <c:pt idx="3">
+                  <c:v>4</c:v>
+                </c:pt>
+                <c:pt idx="4">
+                  <c:v>5</c:v>
+                </c:pt>
+                <c:pt idx="5">
+                  <c:v>6</c:v>
+                </c:pt>
+                <c:pt idx="6">
+                  <c:v>7</c:v>
+                </c:pt>
+                <c:pt idx="7">
+                  <c:v>8</c:v>
+                </c:pt>
+                <c:pt idx="8">
+                  <c:v>9</c:v>
+                </c:pt>
+                <c:pt idx="9">
+                  <c:v>10</c:v>
+                </c:pt>
+                <c:pt idx="10">
+                  <c:v>11</c:v>
+                </c:pt>
+                <c:pt idx="11">
+                  <c:v>12</c:v>
+                </c:pt>
+                <c:pt idx="12">
+                  <c:v>13</c:v>
+                </c:pt>
+                <c:pt idx="13">
+                  <c:v>14</c:v>
+                </c:pt>
+                <c:pt idx="14">
+                  <c:v>15</c:v>
+                </c:pt>
+                <c:pt idx="15">
+                  <c:v>16</c:v>
+                </c:pt>
+                <c:pt idx="16">
+                  <c:v>17</c:v>
+                </c:pt>
+                <c:pt idx="17">
+                  <c:v>18</c:v>
+                </c:pt>
+                <c:pt idx="18">
+                  <c:v>19</c:v>
+                </c:pt>
+                <c:pt idx="19">
+                  <c:v>20</c:v>
+                </c:pt>
+                <c:pt idx="20">
+                  <c:v>21</c:v>
+                </c:pt>
+                <c:pt idx="21">
+                  <c:v>22</c:v>
+                </c:pt>
+                <c:pt idx="22">
+                  <c:v>23</c:v>
+                </c:pt>
+                <c:pt idx="23">
+                  <c:v>24</c:v>
+                </c:pt>
+                <c:pt idx="24">
+                  <c:v>25</c:v>
+                </c:pt>
+                <c:pt idx="25">
+                  <c:v>26</c:v>
+                </c:pt>
+                <c:pt idx="26">
+                  <c:v>27</c:v>
+                </c:pt>
+                <c:pt idx="27">
+                  <c:v>28</c:v>
+                </c:pt>
+                <c:pt idx="28">
+                  <c:v>29</c:v>
+                </c:pt>
+                <c:pt idx="29">
+                  <c:v>30</c:v>
+                </c:pt>
+                <c:pt idx="30">
+                  <c:v>31</c:v>
+                </c:pt>
+                <c:pt idx="31">
+                  <c:v>32</c:v>
+                </c:pt>
+                <c:pt idx="32">
+                  <c:v>33</c:v>
+                </c:pt>
+                <c:pt idx="33">
+                  <c:v>34</c:v>
+                </c:pt>
+                <c:pt idx="34">
+                  <c:v>35</c:v>
+                </c:pt>
+                <c:pt idx="35">
+                  <c:v>36</c:v>
+                </c:pt>
+                <c:pt idx="36">
+                  <c:v>37</c:v>
+                </c:pt>
+                <c:pt idx="37">
+                  <c:v>38</c:v>
+                </c:pt>
+                <c:pt idx="38">
+                  <c:v>39</c:v>
+                </c:pt>
+                <c:pt idx="39">
+                  <c:v>40</c:v>
+                </c:pt>
+                <c:pt idx="40">
+                  <c:v>41</c:v>
+                </c:pt>
+                <c:pt idx="41">
+                  <c:v>42</c:v>
+                </c:pt>
+                <c:pt idx="42">
+                  <c:v>43</c:v>
+                </c:pt>
+                <c:pt idx="43">
+                  <c:v>44</c:v>
+                </c:pt>
+                <c:pt idx="44">
+                  <c:v>45</c:v>
+                </c:pt>
+              </c:numCache>
+            </c:numRef>
+          </c:cat>
+          <c:val>
+            <c:numRef>
+              <c:f>Sheet1!$B$2:$B$46</c:f>
+              <c:numCache>
+                <c:formatCode>General</c:formatCode>
+                <c:ptCount val="45"/>
+                <c:pt idx="0">
+                  <c:v>387.83491706199999</c:v>
+                </c:pt>
+                <c:pt idx="1">
+                  <c:v>202.741809362</c:v>
+                </c:pt>
+                <c:pt idx="2">
+                  <c:v>140.14142913699999</c:v>
+                </c:pt>
+                <c:pt idx="3">
+                  <c:v>105.917827301</c:v>
+                </c:pt>
+                <c:pt idx="4">
+                  <c:v>84.403153401200001</c:v>
+                </c:pt>
+                <c:pt idx="5">
+                  <c:v>68.363045482399997</c:v>
+                </c:pt>
+                <c:pt idx="6">
+                  <c:v>56.404483728599999</c:v>
+                </c:pt>
+                <c:pt idx="7">
+                  <c:v>47.836845482299999</c:v>
+                </c:pt>
+                <c:pt idx="8">
+                  <c:v>41.757445451999999</c:v>
+                </c:pt>
+                <c:pt idx="9">
+                  <c:v>37.284037614399999</c:v>
+                </c:pt>
+                <c:pt idx="10">
+                  <c:v>33.762250013900001</c:v>
+                </c:pt>
+                <c:pt idx="11">
+                  <c:v>30.842895913300001</c:v>
+                </c:pt>
+                <c:pt idx="12">
+                  <c:v>28.3126511247</c:v>
+                </c:pt>
+                <c:pt idx="13">
+                  <c:v>26.0258574016</c:v>
+                </c:pt>
+                <c:pt idx="14">
+                  <c:v>23.853041419099998</c:v>
+                </c:pt>
+                <c:pt idx="15">
+                  <c:v>21.825105190399999</c:v>
+                </c:pt>
+                <c:pt idx="16">
+                  <c:v>19.9339211727</c:v>
+                </c:pt>
+                <c:pt idx="17">
+                  <c:v>18.347126859399999</c:v>
+                </c:pt>
+                <c:pt idx="18">
+                  <c:v>17.099708203700001</c:v>
+                </c:pt>
+                <c:pt idx="19">
+                  <c:v>16.049250109300001</c:v>
+                </c:pt>
+                <c:pt idx="20">
+                  <c:v>15.138560095100001</c:v>
+                </c:pt>
+                <c:pt idx="21">
+                  <c:v>14.194840860599999</c:v>
+                </c:pt>
+                <c:pt idx="22">
+                  <c:v>13.193887162799999</c:v>
+                </c:pt>
+                <c:pt idx="23">
+                  <c:v>12.4247161006</c:v>
+                </c:pt>
+                <c:pt idx="24">
+                  <c:v>11.8420959132</c:v>
+                </c:pt>
+                <c:pt idx="25">
+                  <c:v>11.3415537816</c:v>
+                </c:pt>
+                <c:pt idx="26">
+                  <c:v>10.8807815224</c:v>
+                </c:pt>
+                <c:pt idx="27">
+                  <c:v>10.4356394494</c:v>
+                </c:pt>
+                <c:pt idx="28">
+                  <c:v>9.9842436173600007</c:v>
+                </c:pt>
+              </c:numCache>
+            </c:numRef>
+          </c:val>
+          <c:smooth val="0"/>
+        </c:ser>
+        <c:ser>
+          <c:idx val="1"/>
+          <c:order val="1"/>
+          <c:tx>
+            <c:strRef>
+              <c:f>Sheet1!$C$1</c:f>
+              <c:strCache>
+                <c:ptCount val="1"/>
+                <c:pt idx="0">
+                  <c:v>Set 2</c:v>
+                </c:pt>
+              </c:strCache>
+            </c:strRef>
+          </c:tx>
+          <c:marker>
+            <c:symbol val="none"/>
+          </c:marker>
+          <c:cat>
+            <c:numRef>
+              <c:f>Sheet1!$A$2:$A$46</c:f>
+              <c:numCache>
+                <c:formatCode>General</c:formatCode>
+                <c:ptCount val="45"/>
+                <c:pt idx="0">
+                  <c:v>1</c:v>
+                </c:pt>
+                <c:pt idx="1">
+                  <c:v>2</c:v>
+                </c:pt>
+                <c:pt idx="2">
+                  <c:v>3</c:v>
+                </c:pt>
+                <c:pt idx="3">
+                  <c:v>4</c:v>
+                </c:pt>
+                <c:pt idx="4">
+                  <c:v>5</c:v>
+                </c:pt>
+                <c:pt idx="5">
+                  <c:v>6</c:v>
+                </c:pt>
+                <c:pt idx="6">
+                  <c:v>7</c:v>
+                </c:pt>
+                <c:pt idx="7">
+                  <c:v>8</c:v>
+                </c:pt>
+                <c:pt idx="8">
+                  <c:v>9</c:v>
+                </c:pt>
+                <c:pt idx="9">
+                  <c:v>10</c:v>
+                </c:pt>
+                <c:pt idx="10">
+                  <c:v>11</c:v>
+                </c:pt>
+                <c:pt idx="11">
+                  <c:v>12</c:v>
+                </c:pt>
+                <c:pt idx="12">
+                  <c:v>13</c:v>
+                </c:pt>
+                <c:pt idx="13">
+                  <c:v>14</c:v>
+                </c:pt>
+                <c:pt idx="14">
+                  <c:v>15</c:v>
+                </c:pt>
+                <c:pt idx="15">
+                  <c:v>16</c:v>
+                </c:pt>
+                <c:pt idx="16">
+                  <c:v>17</c:v>
+                </c:pt>
+                <c:pt idx="17">
+                  <c:v>18</c:v>
+                </c:pt>
+                <c:pt idx="18">
+                  <c:v>19</c:v>
+                </c:pt>
+                <c:pt idx="19">
+                  <c:v>20</c:v>
+                </c:pt>
+                <c:pt idx="20">
+                  <c:v>21</c:v>
+                </c:pt>
+                <c:pt idx="21">
+                  <c:v>22</c:v>
+                </c:pt>
+                <c:pt idx="22">
+                  <c:v>23</c:v>
+                </c:pt>
+                <c:pt idx="23">
+                  <c:v>24</c:v>
+                </c:pt>
+                <c:pt idx="24">
+                  <c:v>25</c:v>
+                </c:pt>
+                <c:pt idx="25">
+                  <c:v>26</c:v>
+                </c:pt>
+                <c:pt idx="26">
+                  <c:v>27</c:v>
+                </c:pt>
+                <c:pt idx="27">
+                  <c:v>28</c:v>
+                </c:pt>
+                <c:pt idx="28">
+                  <c:v>29</c:v>
+                </c:pt>
+                <c:pt idx="29">
+                  <c:v>30</c:v>
+                </c:pt>
+                <c:pt idx="30">
+                  <c:v>31</c:v>
+                </c:pt>
+                <c:pt idx="31">
+                  <c:v>32</c:v>
+                </c:pt>
+                <c:pt idx="32">
+                  <c:v>33</c:v>
+                </c:pt>
+                <c:pt idx="33">
+                  <c:v>34</c:v>
+                </c:pt>
+                <c:pt idx="34">
+                  <c:v>35</c:v>
+                </c:pt>
+                <c:pt idx="35">
+                  <c:v>36</c:v>
+                </c:pt>
+                <c:pt idx="36">
+                  <c:v>37</c:v>
+                </c:pt>
+                <c:pt idx="37">
+                  <c:v>38</c:v>
+                </c:pt>
+                <c:pt idx="38">
+                  <c:v>39</c:v>
+                </c:pt>
+                <c:pt idx="39">
+                  <c:v>40</c:v>
+                </c:pt>
+                <c:pt idx="40">
+                  <c:v>41</c:v>
+                </c:pt>
+                <c:pt idx="41">
+                  <c:v>42</c:v>
+                </c:pt>
+                <c:pt idx="42">
+                  <c:v>43</c:v>
+                </c:pt>
+                <c:pt idx="43">
+                  <c:v>44</c:v>
+                </c:pt>
+                <c:pt idx="44">
+                  <c:v>45</c:v>
+                </c:pt>
+              </c:numCache>
+            </c:numRef>
+          </c:cat>
+          <c:val>
+            <c:numRef>
+              <c:f>Sheet1!$C$2:$C$46</c:f>
+              <c:numCache>
+                <c:formatCode>General</c:formatCode>
+                <c:ptCount val="45"/>
+                <c:pt idx="0">
+                  <c:v>396.69304386499999</c:v>
+                </c:pt>
+                <c:pt idx="1">
+                  <c:v>186.26504870799999</c:v>
+                </c:pt>
+                <c:pt idx="2">
+                  <c:v>130.18291093100001</c:v>
+                </c:pt>
+                <c:pt idx="3">
+                  <c:v>97.693485683500001</c:v>
+                </c:pt>
+                <c:pt idx="4">
+                  <c:v>76.963198747199996</c:v>
+                </c:pt>
+                <c:pt idx="5">
+                  <c:v>64.221962127799998</c:v>
+                </c:pt>
+                <c:pt idx="6">
+                  <c:v>54.451035152000003</c:v>
+                </c:pt>
+                <c:pt idx="7">
+                  <c:v>46.049413637599997</c:v>
+                </c:pt>
+                <c:pt idx="8">
+                  <c:v>39.260419378000002</c:v>
+                </c:pt>
+                <c:pt idx="9">
+                  <c:v>34.24543577</c:v>
+                </c:pt>
+                <c:pt idx="10">
+                  <c:v>30.231504955799998</c:v>
+                </c:pt>
+                <c:pt idx="11">
+                  <c:v>27.060711986000001</c:v>
+                </c:pt>
+                <c:pt idx="12">
+                  <c:v>24.342288832099999</c:v>
+                </c:pt>
+                <c:pt idx="13">
+                  <c:v>21.970048329699999</c:v>
+                </c:pt>
+                <c:pt idx="14">
+                  <c:v>20.063361541300001</c:v>
+                </c:pt>
+                <c:pt idx="15">
+                  <c:v>18.494749803000001</c:v>
+                </c:pt>
+                <c:pt idx="16">
+                  <c:v>17.169004279599999</c:v>
+                </c:pt>
+                <c:pt idx="17">
+                  <c:v>16.0333668269</c:v>
+                </c:pt>
+                <c:pt idx="18">
+                  <c:v>15.0492002014</c:v>
+                </c:pt>
+                <c:pt idx="19">
+                  <c:v>14.190386547799999</c:v>
+                </c:pt>
+                <c:pt idx="20">
+                  <c:v>13.438066317800001</c:v>
+                </c:pt>
+                <c:pt idx="21">
+                  <c:v>12.7766750579</c:v>
+                </c:pt>
+                <c:pt idx="22">
+                  <c:v>12.1922932612</c:v>
+                </c:pt>
+                <c:pt idx="23">
+                  <c:v>11.672682140799999</c:v>
+                </c:pt>
+                <c:pt idx="24">
+                  <c:v>11.2076093701</c:v>
+                </c:pt>
+                <c:pt idx="25">
+                  <c:v>10.788782899199999</c:v>
+                </c:pt>
+                <c:pt idx="26">
+                  <c:v>10.4095213653</c:v>
+                </c:pt>
+                <c:pt idx="27">
+                  <c:v>10.064396800800001</c:v>
+                </c:pt>
+                <c:pt idx="28">
+                  <c:v>9.7489434118399991</c:v>
+                </c:pt>
+              </c:numCache>
+            </c:numRef>
+          </c:val>
+          <c:smooth val="0"/>
+        </c:ser>
+        <c:ser>
+          <c:idx val="2"/>
+          <c:order val="2"/>
+          <c:tx>
+            <c:strRef>
+              <c:f>Sheet1!$D$1</c:f>
+              <c:strCache>
+                <c:ptCount val="1"/>
+                <c:pt idx="0">
+                  <c:v>Set 3</c:v>
+                </c:pt>
+              </c:strCache>
+            </c:strRef>
+          </c:tx>
+          <c:marker>
+            <c:symbol val="none"/>
+          </c:marker>
+          <c:cat>
+            <c:numRef>
+              <c:f>Sheet1!$A$2:$A$46</c:f>
+              <c:numCache>
+                <c:formatCode>General</c:formatCode>
+                <c:ptCount val="45"/>
+                <c:pt idx="0">
+                  <c:v>1</c:v>
+                </c:pt>
+                <c:pt idx="1">
+                  <c:v>2</c:v>
+                </c:pt>
+                <c:pt idx="2">
+                  <c:v>3</c:v>
+                </c:pt>
+                <c:pt idx="3">
+                  <c:v>4</c:v>
+                </c:pt>
+                <c:pt idx="4">
+                  <c:v>5</c:v>
+                </c:pt>
+                <c:pt idx="5">
+                  <c:v>6</c:v>
+                </c:pt>
+                <c:pt idx="6">
+                  <c:v>7</c:v>
+                </c:pt>
+                <c:pt idx="7">
+                  <c:v>8</c:v>
+                </c:pt>
+                <c:pt idx="8">
+                  <c:v>9</c:v>
+                </c:pt>
+                <c:pt idx="9">
+                  <c:v>10</c:v>
+                </c:pt>
+                <c:pt idx="10">
+                  <c:v>11</c:v>
+                </c:pt>
+                <c:pt idx="11">
+                  <c:v>12</c:v>
+                </c:pt>
+                <c:pt idx="12">
+                  <c:v>13</c:v>
+                </c:pt>
+                <c:pt idx="13">
+                  <c:v>14</c:v>
+                </c:pt>
+                <c:pt idx="14">
+                  <c:v>15</c:v>
+                </c:pt>
+                <c:pt idx="15">
+                  <c:v>16</c:v>
+                </c:pt>
+                <c:pt idx="16">
+                  <c:v>17</c:v>
+                </c:pt>
+                <c:pt idx="17">
+                  <c:v>18</c:v>
+                </c:pt>
+                <c:pt idx="18">
+                  <c:v>19</c:v>
+                </c:pt>
+                <c:pt idx="19">
+                  <c:v>20</c:v>
+                </c:pt>
+                <c:pt idx="20">
+                  <c:v>21</c:v>
+                </c:pt>
+                <c:pt idx="21">
+                  <c:v>22</c:v>
+                </c:pt>
+                <c:pt idx="22">
+                  <c:v>23</c:v>
+                </c:pt>
+                <c:pt idx="23">
+                  <c:v>24</c:v>
+                </c:pt>
+                <c:pt idx="24">
+                  <c:v>25</c:v>
+                </c:pt>
+                <c:pt idx="25">
+                  <c:v>26</c:v>
+                </c:pt>
+                <c:pt idx="26">
+                  <c:v>27</c:v>
+                </c:pt>
+                <c:pt idx="27">
+                  <c:v>28</c:v>
+                </c:pt>
+                <c:pt idx="28">
+                  <c:v>29</c:v>
+                </c:pt>
+                <c:pt idx="29">
+                  <c:v>30</c:v>
+                </c:pt>
+                <c:pt idx="30">
+                  <c:v>31</c:v>
+                </c:pt>
+                <c:pt idx="31">
+                  <c:v>32</c:v>
+                </c:pt>
+                <c:pt idx="32">
+                  <c:v>33</c:v>
+                </c:pt>
+                <c:pt idx="33">
+                  <c:v>34</c:v>
+                </c:pt>
+                <c:pt idx="34">
+                  <c:v>35</c:v>
+                </c:pt>
+                <c:pt idx="35">
+                  <c:v>36</c:v>
+                </c:pt>
+                <c:pt idx="36">
+                  <c:v>37</c:v>
+                </c:pt>
+                <c:pt idx="37">
+                  <c:v>38</c:v>
+                </c:pt>
+                <c:pt idx="38">
+                  <c:v>39</c:v>
+                </c:pt>
+                <c:pt idx="39">
+                  <c:v>40</c:v>
+                </c:pt>
+                <c:pt idx="40">
+                  <c:v>41</c:v>
+                </c:pt>
+                <c:pt idx="41">
+                  <c:v>42</c:v>
+                </c:pt>
+                <c:pt idx="42">
+                  <c:v>43</c:v>
+                </c:pt>
+                <c:pt idx="43">
+                  <c:v>44</c:v>
+                </c:pt>
+                <c:pt idx="44">
+                  <c:v>45</c:v>
+                </c:pt>
+              </c:numCache>
+            </c:numRef>
+          </c:cat>
+          <c:val>
+            <c:numRef>
+              <c:f>Sheet1!$D$2:$D$46</c:f>
+              <c:numCache>
+                <c:formatCode>General</c:formatCode>
+                <c:ptCount val="45"/>
+                <c:pt idx="0">
+                  <c:v>408.11624020599999</c:v>
+                </c:pt>
+                <c:pt idx="1">
+                  <c:v>178.823695405</c:v>
+                </c:pt>
+                <c:pt idx="2">
+                  <c:v>126.34597663300001</c:v>
+                </c:pt>
+                <c:pt idx="3">
+                  <c:v>97.395796675300005</c:v>
+                </c:pt>
+                <c:pt idx="4">
+                  <c:v>80.024335390299996</c:v>
+                </c:pt>
+                <c:pt idx="5">
+                  <c:v>68.052286475200006</c:v>
+                </c:pt>
+                <c:pt idx="6">
+                  <c:v>58.146687617200001</c:v>
+                </c:pt>
+                <c:pt idx="7">
+                  <c:v>50.780432745399999</c:v>
+                </c:pt>
+                <c:pt idx="8">
+                  <c:v>44.770651612000002</c:v>
+                </c:pt>
+                <c:pt idx="9">
+                  <c:v>39.571851402299998</c:v>
+                </c:pt>
+                <c:pt idx="10">
+                  <c:v>35.1661618332</c:v>
+                </c:pt>
+                <c:pt idx="11">
+                  <c:v>31.6322420945</c:v>
+                </c:pt>
+                <c:pt idx="12">
+                  <c:v>28.892803923799999</c:v>
+                </c:pt>
+                <c:pt idx="13">
+                  <c:v>26.6132847083</c:v>
+                </c:pt>
+                <c:pt idx="14">
+                  <c:v>24.683893235599999</c:v>
+                </c:pt>
+                <c:pt idx="15">
+                  <c:v>23.0280912831</c:v>
+                </c:pt>
+                <c:pt idx="16">
+                  <c:v>21.596142257</c:v>
+                </c:pt>
+                <c:pt idx="17">
+                  <c:v>20.356863520499999</c:v>
+                </c:pt>
+                <c:pt idx="18">
+                  <c:v>19.289129020400001</c:v>
+                </c:pt>
+                <c:pt idx="19">
+                  <c:v>18.3704386828</c:v>
+                </c:pt>
+                <c:pt idx="20">
+                  <c:v>17.5753374861</c:v>
+                </c:pt>
+                <c:pt idx="21">
+                  <c:v>16.880222104000001</c:v>
+                </c:pt>
+                <c:pt idx="22">
+                  <c:v>16.2656603824</c:v>
+                </c:pt>
+                <c:pt idx="23">
+                  <c:v>15.716024973</c:v>
+                </c:pt>
+                <c:pt idx="24">
+                  <c:v>15.218294458000001</c:v>
+                </c:pt>
+                <c:pt idx="25">
+                  <c:v>14.7607398689</c:v>
+                </c:pt>
+                <c:pt idx="26">
+                  <c:v>14.331540932099999</c:v>
+                </c:pt>
+                <c:pt idx="27">
+                  <c:v>13.917464582799999</c:v>
+                </c:pt>
+                <c:pt idx="28">
+                  <c:v>13.5043068616</c:v>
+                </c:pt>
+                <c:pt idx="29">
+                  <c:v>13.0854624604</c:v>
+                </c:pt>
+                <c:pt idx="30">
+                  <c:v>12.681719835199999</c:v>
+                </c:pt>
+                <c:pt idx="31">
+                  <c:v>12.331444277199999</c:v>
+                </c:pt>
+                <c:pt idx="32">
+                  <c:v>12.0391768919</c:v>
+                </c:pt>
+                <c:pt idx="33">
+                  <c:v>11.7855380359</c:v>
+                </c:pt>
+                <c:pt idx="34">
+                  <c:v>11.557547041299999</c:v>
+                </c:pt>
+                <c:pt idx="35">
+                  <c:v>11.349016583699999</c:v>
+                </c:pt>
+                <c:pt idx="36">
+                  <c:v>11.156496971999999</c:v>
+                </c:pt>
+                <c:pt idx="37">
+                  <c:v>10.977676621000001</c:v>
+                </c:pt>
+                <c:pt idx="38">
+                  <c:v>10.810822822700001</c:v>
+                </c:pt>
+                <c:pt idx="39">
+                  <c:v>10.654550886899999</c:v>
+                </c:pt>
+                <c:pt idx="40">
+                  <c:v>10.5077091457</c:v>
+                </c:pt>
+                <c:pt idx="41">
+                  <c:v>10.3693116741</c:v>
+                </c:pt>
+                <c:pt idx="42">
+                  <c:v>10.2384931059</c:v>
+                </c:pt>
+                <c:pt idx="43">
+                  <c:v>10.114473932599999</c:v>
+                </c:pt>
+                <c:pt idx="44">
+                  <c:v>9.9965294904899995</c:v>
+                </c:pt>
+              </c:numCache>
+            </c:numRef>
+          </c:val>
+          <c:smooth val="0"/>
+        </c:ser>
+        <c:ser>
+          <c:idx val="3"/>
+          <c:order val="3"/>
+          <c:tx>
+            <c:strRef>
+              <c:f>Sheet1!$E$1</c:f>
+              <c:strCache>
+                <c:ptCount val="1"/>
+                <c:pt idx="0">
+                  <c:v>Set 4</c:v>
+                </c:pt>
+              </c:strCache>
+            </c:strRef>
+          </c:tx>
+          <c:marker>
+            <c:symbol val="none"/>
+          </c:marker>
+          <c:cat>
+            <c:numRef>
+              <c:f>Sheet1!$A$2:$A$46</c:f>
+              <c:numCache>
+                <c:formatCode>General</c:formatCode>
+                <c:ptCount val="45"/>
+                <c:pt idx="0">
+                  <c:v>1</c:v>
+                </c:pt>
+                <c:pt idx="1">
+                  <c:v>2</c:v>
+                </c:pt>
+                <c:pt idx="2">
+                  <c:v>3</c:v>
+                </c:pt>
+                <c:pt idx="3">
+                  <c:v>4</c:v>
+                </c:pt>
+                <c:pt idx="4">
+                  <c:v>5</c:v>
+                </c:pt>
+                <c:pt idx="5">
+                  <c:v>6</c:v>
+                </c:pt>
+                <c:pt idx="6">
+                  <c:v>7</c:v>
+                </c:pt>
+                <c:pt idx="7">
+                  <c:v>8</c:v>
+                </c:pt>
+                <c:pt idx="8">
+                  <c:v>9</c:v>
+                </c:pt>
+                <c:pt idx="9">
+                  <c:v>10</c:v>
+                </c:pt>
+                <c:pt idx="10">
+                  <c:v>11</c:v>
+                </c:pt>
+                <c:pt idx="11">
+                  <c:v>12</c:v>
+                </c:pt>
+                <c:pt idx="12">
+                  <c:v>13</c:v>
+                </c:pt>
+                <c:pt idx="13">
+                  <c:v>14</c:v>
+                </c:pt>
+                <c:pt idx="14">
+                  <c:v>15</c:v>
+                </c:pt>
+                <c:pt idx="15">
+                  <c:v>16</c:v>
+                </c:pt>
+                <c:pt idx="16">
+                  <c:v>17</c:v>
+                </c:pt>
+                <c:pt idx="17">
+                  <c:v>18</c:v>
+                </c:pt>
+                <c:pt idx="18">
+                  <c:v>19</c:v>
+                </c:pt>
+                <c:pt idx="19">
+                  <c:v>20</c:v>
+                </c:pt>
+                <c:pt idx="20">
+                  <c:v>21</c:v>
+                </c:pt>
+                <c:pt idx="21">
+                  <c:v>22</c:v>
+                </c:pt>
+                <c:pt idx="22">
+                  <c:v>23</c:v>
+                </c:pt>
+                <c:pt idx="23">
+                  <c:v>24</c:v>
+                </c:pt>
+                <c:pt idx="24">
+                  <c:v>25</c:v>
+                </c:pt>
+                <c:pt idx="25">
+                  <c:v>26</c:v>
+                </c:pt>
+                <c:pt idx="26">
+                  <c:v>27</c:v>
+                </c:pt>
+                <c:pt idx="27">
+                  <c:v>28</c:v>
+                </c:pt>
+                <c:pt idx="28">
+                  <c:v>29</c:v>
+                </c:pt>
+                <c:pt idx="29">
+                  <c:v>30</c:v>
+                </c:pt>
+                <c:pt idx="30">
+                  <c:v>31</c:v>
+                </c:pt>
+                <c:pt idx="31">
+                  <c:v>32</c:v>
+                </c:pt>
+                <c:pt idx="32">
+                  <c:v>33</c:v>
+                </c:pt>
+                <c:pt idx="33">
+                  <c:v>34</c:v>
+                </c:pt>
+                <c:pt idx="34">
+                  <c:v>35</c:v>
+                </c:pt>
+                <c:pt idx="35">
+                  <c:v>36</c:v>
+                </c:pt>
+                <c:pt idx="36">
+                  <c:v>37</c:v>
+                </c:pt>
+                <c:pt idx="37">
+                  <c:v>38</c:v>
+                </c:pt>
+                <c:pt idx="38">
+                  <c:v>39</c:v>
+                </c:pt>
+                <c:pt idx="39">
+                  <c:v>40</c:v>
+                </c:pt>
+                <c:pt idx="40">
+                  <c:v>41</c:v>
+                </c:pt>
+                <c:pt idx="41">
+                  <c:v>42</c:v>
+                </c:pt>
+                <c:pt idx="42">
+                  <c:v>43</c:v>
+                </c:pt>
+                <c:pt idx="43">
+                  <c:v>44</c:v>
+                </c:pt>
+                <c:pt idx="44">
+                  <c:v>45</c:v>
+                </c:pt>
+              </c:numCache>
+            </c:numRef>
+          </c:cat>
+          <c:val>
+            <c:numRef>
+              <c:f>Sheet1!$E$2:$E$46</c:f>
+              <c:numCache>
+                <c:formatCode>General</c:formatCode>
+                <c:ptCount val="45"/>
+                <c:pt idx="0">
+                  <c:v>409.41289285900001</c:v>
+                </c:pt>
+                <c:pt idx="1">
+                  <c:v>187.32611317999999</c:v>
+                </c:pt>
+                <c:pt idx="2">
+                  <c:v>123.713323911</c:v>
+                </c:pt>
+                <c:pt idx="3">
+                  <c:v>93.199336296599995</c:v>
+                </c:pt>
+                <c:pt idx="4">
+                  <c:v>73.582112895099996</c:v>
+                </c:pt>
+                <c:pt idx="5">
+                  <c:v>60.187008911299998</c:v>
+                </c:pt>
+                <c:pt idx="6">
+                  <c:v>50.6893214798</c:v>
+                </c:pt>
+                <c:pt idx="7">
+                  <c:v>43.590871531200001</c:v>
+                </c:pt>
+                <c:pt idx="8">
+                  <c:v>38.034565876400002</c:v>
+                </c:pt>
+                <c:pt idx="9">
+                  <c:v>33.760565039900001</c:v>
+                </c:pt>
+                <c:pt idx="10">
+                  <c:v>30.335811294199999</c:v>
+                </c:pt>
+                <c:pt idx="11">
+                  <c:v>27.479308017000001</c:v>
+                </c:pt>
+                <c:pt idx="12">
+                  <c:v>25.0201615388</c:v>
+                </c:pt>
+                <c:pt idx="13">
+                  <c:v>22.870700379399999</c:v>
+                </c:pt>
+                <c:pt idx="14">
+                  <c:v>21.009431883200001</c:v>
+                </c:pt>
+                <c:pt idx="15">
+                  <c:v>19.418940669200001</c:v>
+                </c:pt>
+                <c:pt idx="16">
+                  <c:v>18.056413472599999</c:v>
+                </c:pt>
+                <c:pt idx="17">
+                  <c:v>16.868448281999999</c:v>
+                </c:pt>
+                <c:pt idx="18">
+                  <c:v>15.8326526461</c:v>
+                </c:pt>
+                <c:pt idx="19">
+                  <c:v>14.9368469814</c:v>
+                </c:pt>
+                <c:pt idx="20">
+                  <c:v>14.159392521099999</c:v>
+                </c:pt>
+                <c:pt idx="21">
+                  <c:v>13.4788023007</c:v>
+                </c:pt>
+                <c:pt idx="22">
+                  <c:v>12.876959529500001</c:v>
+                </c:pt>
+                <c:pt idx="23">
+                  <c:v>12.338796068200001</c:v>
+                </c:pt>
+                <c:pt idx="24">
+                  <c:v>11.851690741600001</c:v>
+                </c:pt>
+                <c:pt idx="25">
+                  <c:v>11.4048854484</c:v>
+                </c:pt>
+                <c:pt idx="26">
+                  <c:v>10.9889970976</c:v>
+                </c:pt>
+                <c:pt idx="27">
+                  <c:v>10.595789588300001</c:v>
+                </c:pt>
+                <c:pt idx="28">
+                  <c:v>10.2184748705</c:v>
+                </c:pt>
+                <c:pt idx="29">
+                  <c:v>9.8527878208599997</c:v>
+                </c:pt>
+              </c:numCache>
+            </c:numRef>
+          </c:val>
+          <c:smooth val="0"/>
+        </c:ser>
+        <c:ser>
+          <c:idx val="4"/>
+          <c:order val="4"/>
+          <c:tx>
+            <c:strRef>
+              <c:f>Sheet1!$F$1</c:f>
+              <c:strCache>
+                <c:ptCount val="1"/>
+                <c:pt idx="0">
+                  <c:v>Set 5</c:v>
+                </c:pt>
+              </c:strCache>
+            </c:strRef>
+          </c:tx>
+          <c:marker>
+            <c:symbol val="none"/>
+          </c:marker>
+          <c:cat>
+            <c:numRef>
+              <c:f>Sheet1!$A$2:$A$46</c:f>
+              <c:numCache>
+                <c:formatCode>General</c:formatCode>
+                <c:ptCount val="45"/>
+                <c:pt idx="0">
+                  <c:v>1</c:v>
+                </c:pt>
+                <c:pt idx="1">
+                  <c:v>2</c:v>
+                </c:pt>
+                <c:pt idx="2">
+                  <c:v>3</c:v>
+                </c:pt>
+                <c:pt idx="3">
+                  <c:v>4</c:v>
+                </c:pt>
+                <c:pt idx="4">
+                  <c:v>5</c:v>
+                </c:pt>
+                <c:pt idx="5">
+                  <c:v>6</c:v>
+                </c:pt>
+                <c:pt idx="6">
+                  <c:v>7</c:v>
+                </c:pt>
+                <c:pt idx="7">
+                  <c:v>8</c:v>
+                </c:pt>
+                <c:pt idx="8">
+                  <c:v>9</c:v>
+                </c:pt>
+                <c:pt idx="9">
+                  <c:v>10</c:v>
+                </c:pt>
+                <c:pt idx="10">
+                  <c:v>11</c:v>
+                </c:pt>
+                <c:pt idx="11">
+                  <c:v>12</c:v>
+                </c:pt>
+                <c:pt idx="12">
+                  <c:v>13</c:v>
+                </c:pt>
+                <c:pt idx="13">
+                  <c:v>14</c:v>
+                </c:pt>
+                <c:pt idx="14">
+                  <c:v>15</c:v>
+                </c:pt>
+                <c:pt idx="15">
+                  <c:v>16</c:v>
+                </c:pt>
+                <c:pt idx="16">
+                  <c:v>17</c:v>
+                </c:pt>
+                <c:pt idx="17">
+                  <c:v>18</c:v>
+                </c:pt>
+                <c:pt idx="18">
+                  <c:v>19</c:v>
+                </c:pt>
+                <c:pt idx="19">
+                  <c:v>20</c:v>
+                </c:pt>
+                <c:pt idx="20">
+                  <c:v>21</c:v>
+                </c:pt>
+                <c:pt idx="21">
+                  <c:v>22</c:v>
+                </c:pt>
+                <c:pt idx="22">
+                  <c:v>23</c:v>
+                </c:pt>
+                <c:pt idx="23">
+                  <c:v>24</c:v>
+                </c:pt>
+                <c:pt idx="24">
+                  <c:v>25</c:v>
+                </c:pt>
+                <c:pt idx="25">
+                  <c:v>26</c:v>
+                </c:pt>
+                <c:pt idx="26">
+                  <c:v>27</c:v>
+                </c:pt>
+                <c:pt idx="27">
+                  <c:v>28</c:v>
+                </c:pt>
+                <c:pt idx="28">
+                  <c:v>29</c:v>
+                </c:pt>
+                <c:pt idx="29">
+                  <c:v>30</c:v>
+                </c:pt>
+                <c:pt idx="30">
+                  <c:v>31</c:v>
+                </c:pt>
+                <c:pt idx="31">
+                  <c:v>32</c:v>
+                </c:pt>
+                <c:pt idx="32">
+                  <c:v>33</c:v>
+                </c:pt>
+                <c:pt idx="33">
+                  <c:v>34</c:v>
+                </c:pt>
+                <c:pt idx="34">
+                  <c:v>35</c:v>
+                </c:pt>
+                <c:pt idx="35">
+                  <c:v>36</c:v>
+                </c:pt>
+                <c:pt idx="36">
+                  <c:v>37</c:v>
+                </c:pt>
+                <c:pt idx="37">
+                  <c:v>38</c:v>
+                </c:pt>
+                <c:pt idx="38">
+                  <c:v>39</c:v>
+                </c:pt>
+                <c:pt idx="39">
+                  <c:v>40</c:v>
+                </c:pt>
+                <c:pt idx="40">
+                  <c:v>41</c:v>
+                </c:pt>
+                <c:pt idx="41">
+                  <c:v>42</c:v>
+                </c:pt>
+                <c:pt idx="42">
+                  <c:v>43</c:v>
+                </c:pt>
+                <c:pt idx="43">
+                  <c:v>44</c:v>
+                </c:pt>
+                <c:pt idx="44">
+                  <c:v>45</c:v>
+                </c:pt>
+              </c:numCache>
+            </c:numRef>
+          </c:cat>
+          <c:val>
+            <c:numRef>
+              <c:f>Sheet1!$F$2:$F$46</c:f>
+              <c:numCache>
+                <c:formatCode>General</c:formatCode>
+                <c:ptCount val="45"/>
+                <c:pt idx="0">
+                  <c:v>389.24772868100001</c:v>
+                </c:pt>
+                <c:pt idx="1">
+                  <c:v>190.10901604700001</c:v>
+                </c:pt>
+                <c:pt idx="2">
+                  <c:v>134.27645326699999</c:v>
+                </c:pt>
+                <c:pt idx="3">
+                  <c:v>101.295287637</c:v>
+                </c:pt>
+                <c:pt idx="4">
+                  <c:v>81.129520792099996</c:v>
+                </c:pt>
+                <c:pt idx="5">
+                  <c:v>68.134951153800003</c:v>
+                </c:pt>
+                <c:pt idx="6">
+                  <c:v>58.170983325900004</c:v>
+                </c:pt>
+                <c:pt idx="7">
+                  <c:v>50.577167352399997</c:v>
+                </c:pt>
+                <c:pt idx="8">
+                  <c:v>44.682634059000002</c:v>
+                </c:pt>
+                <c:pt idx="9">
+                  <c:v>39.438149025000001</c:v>
+                </c:pt>
+                <c:pt idx="10">
+                  <c:v>34.593387106000002</c:v>
+                </c:pt>
+                <c:pt idx="11">
+                  <c:v>30.442581079699998</c:v>
+                </c:pt>
+                <c:pt idx="12">
+                  <c:v>27.3693995685</c:v>
+                </c:pt>
+                <c:pt idx="13">
+                  <c:v>25.004174584899999</c:v>
+                </c:pt>
+                <c:pt idx="14">
+                  <c:v>22.916339799999999</c:v>
+                </c:pt>
+                <c:pt idx="15">
+                  <c:v>20.938349182</c:v>
+                </c:pt>
+                <c:pt idx="16">
+                  <c:v>19.158369894700002</c:v>
+                </c:pt>
+                <c:pt idx="17">
+                  <c:v>17.3980827213</c:v>
+                </c:pt>
+                <c:pt idx="18">
+                  <c:v>15.8853035337</c:v>
+                </c:pt>
+                <c:pt idx="19">
+                  <c:v>14.9255994068</c:v>
+                </c:pt>
+                <c:pt idx="20">
+                  <c:v>14.131612371399999</c:v>
+                </c:pt>
+                <c:pt idx="21">
+                  <c:v>13.442157701499999</c:v>
+                </c:pt>
+                <c:pt idx="22">
+                  <c:v>12.8321109892</c:v>
+                </c:pt>
+                <c:pt idx="23">
+                  <c:v>12.284409696699999</c:v>
+                </c:pt>
+                <c:pt idx="24">
+                  <c:v>11.783784906299999</c:v>
+                </c:pt>
+                <c:pt idx="25">
+                  <c:v>11.314851408099999</c:v>
+                </c:pt>
+                <c:pt idx="26">
+                  <c:v>10.860968828900001</c:v>
+                </c:pt>
+                <c:pt idx="27">
+                  <c:v>10.4069838347</c:v>
+                </c:pt>
+                <c:pt idx="28">
+                  <c:v>9.9544986640499999</c:v>
+                </c:pt>
+              </c:numCache>
+            </c:numRef>
+          </c:val>
+          <c:smooth val="0"/>
+        </c:ser>
+        <c:dLbls>
+          <c:showLegendKey val="0"/>
+          <c:showVal val="0"/>
+          <c:showCatName val="0"/>
+          <c:showSerName val="0"/>
+          <c:showPercent val="0"/>
+          <c:showBubbleSize val="0"/>
+        </c:dLbls>
+        <c:marker val="1"/>
+        <c:smooth val="0"/>
+        <c:axId val="87044096"/>
+        <c:axId val="87045632"/>
+      </c:lineChart>
+      <c:catAx>
+        <c:axId val="87044096"/>
+        <c:scaling>
+          <c:orientation val="minMax"/>
+        </c:scaling>
+        <c:delete val="0"/>
+        <c:axPos val="b"/>
+        <c:title>
+          <c:tx>
+            <c:rich>
+              <a:bodyPr/>
+              <a:lstStyle/>
+              <a:p>
+                <a:pPr>
+                  <a:defRPr/>
+                </a:pPr>
+                <a:r>
+                  <a:rPr lang="en-US" dirty="0" smtClean="0"/>
+                  <a:t>Iteration</a:t>
+                </a:r>
+                <a:r>
+                  <a:rPr lang="en-US" baseline="0" dirty="0" smtClean="0"/>
+                  <a:t> Number</a:t>
+                </a:r>
+                <a:endParaRPr lang="en-IN" dirty="0"/>
+              </a:p>
+            </c:rich>
+          </c:tx>
+          <c:layout/>
+          <c:overlay val="0"/>
+        </c:title>
+        <c:numFmt formatCode="General" sourceLinked="1"/>
+        <c:majorTickMark val="out"/>
+        <c:minorTickMark val="none"/>
+        <c:tickLblPos val="nextTo"/>
+        <c:crossAx val="87045632"/>
+        <c:crosses val="autoZero"/>
+        <c:auto val="1"/>
+        <c:lblAlgn val="ctr"/>
+        <c:lblOffset val="100"/>
+        <c:noMultiLvlLbl val="0"/>
+      </c:catAx>
+      <c:valAx>
+        <c:axId val="87045632"/>
+        <c:scaling>
+          <c:orientation val="minMax"/>
+        </c:scaling>
+        <c:delete val="0"/>
+        <c:axPos val="l"/>
+        <c:title>
+          <c:tx>
+            <c:rich>
+              <a:bodyPr rot="-5400000" vert="horz"/>
+              <a:lstStyle/>
+              <a:p>
+                <a:pPr>
+                  <a:defRPr/>
+                </a:pPr>
+                <a:r>
+                  <a:rPr lang="en-IN" dirty="0" smtClean="0"/>
+                  <a:t>Error</a:t>
+                </a:r>
+                <a:endParaRPr lang="en-IN" dirty="0"/>
+              </a:p>
+            </c:rich>
+          </c:tx>
+          <c:layout/>
+          <c:overlay val="0"/>
+        </c:title>
+        <c:numFmt formatCode="General" sourceLinked="1"/>
+        <c:majorTickMark val="out"/>
+        <c:minorTickMark val="none"/>
+        <c:tickLblPos val="nextTo"/>
+        <c:crossAx val="87044096"/>
+        <c:crosses val="autoZero"/>
+        <c:crossBetween val="between"/>
+      </c:valAx>
+    </c:plotArea>
+    <c:legend>
+      <c:legendPos val="t"/>
+      <c:layout/>
+      <c:overlay val="0"/>
+    </c:legend>
+    <c:plotVisOnly val="1"/>
+    <c:dispBlanksAs val="gap"/>
+    <c:showDLblsOverMax val="0"/>
+  </c:chart>
+  <c:txPr>
+    <a:bodyPr/>
+    <a:lstStyle/>
+    <a:p>
+      <a:pPr>
+        <a:defRPr sz="1800"/>
+      </a:pPr>
+      <a:endParaRPr lang="en-US"/>
+    </a:p>
+  </c:txPr>
+  <c:externalData r:id="rId1">
+    <c:autoUpdate val="0"/>
+  </c:externalData>
+</c:chartSpace>
+</file>
+
+<file path=ppt/charts/chart2.xml><?xml version="1.0" encoding="utf-8"?>
+<c:chartSpace xmlns:c="http://schemas.openxmlformats.org/drawingml/2006/chart" xmlns:a="http://schemas.openxmlformats.org/drawingml/2006/main" xmlns:r="http://schemas.openxmlformats.org/officeDocument/2006/relationships">
+  <c:date1904 val="0"/>
+  <c:lang val="en-IN"/>
+  <c:roundedCorners val="0"/>
+  <mc:AlternateContent xmlns:mc="http://schemas.openxmlformats.org/markup-compatibility/2006">
+    <mc:Choice xmlns:c14="http://schemas.microsoft.com/office/drawing/2007/8/2/chart" Requires="c14">
+      <c14:style val="102"/>
+    </mc:Choice>
+    <mc:Fallback>
+      <c:style val="2"/>
+    </mc:Fallback>
+  </mc:AlternateContent>
+  <c:chart>
+    <c:autoTitleDeleted val="0"/>
+    <c:plotArea>
+      <c:layout/>
+      <c:barChart>
+        <c:barDir val="col"/>
+        <c:grouping val="clustered"/>
+        <c:varyColors val="0"/>
+        <c:ser>
+          <c:idx val="0"/>
+          <c:order val="0"/>
+          <c:tx>
+            <c:strRef>
+              <c:f>Sheet1!$B$1</c:f>
+              <c:strCache>
+                <c:ptCount val="1"/>
+                <c:pt idx="0">
+                  <c:v>Accuracy</c:v>
+                </c:pt>
+              </c:strCache>
+            </c:strRef>
+          </c:tx>
+          <c:invertIfNegative val="0"/>
+          <c:cat>
+            <c:strRef>
+              <c:f>Sheet1!$A$2:$A$6</c:f>
+              <c:strCache>
+                <c:ptCount val="5"/>
+                <c:pt idx="0">
+                  <c:v>Set 1</c:v>
+                </c:pt>
+                <c:pt idx="1">
+                  <c:v>Set 2</c:v>
+                </c:pt>
+                <c:pt idx="2">
+                  <c:v>Set 3</c:v>
+                </c:pt>
+                <c:pt idx="3">
+                  <c:v>Set 4</c:v>
+                </c:pt>
+                <c:pt idx="4">
+                  <c:v>Set 5</c:v>
+                </c:pt>
+              </c:strCache>
+            </c:strRef>
+          </c:cat>
+          <c:val>
+            <c:numRef>
+              <c:f>Sheet1!$B$2:$B$6</c:f>
+              <c:numCache>
+                <c:formatCode>General</c:formatCode>
+                <c:ptCount val="5"/>
+                <c:pt idx="0">
+                  <c:v>58.58</c:v>
+                </c:pt>
+                <c:pt idx="1">
+                  <c:v>65</c:v>
+                </c:pt>
+                <c:pt idx="2">
+                  <c:v>68.680000000000007</c:v>
+                </c:pt>
+                <c:pt idx="3">
+                  <c:v>64</c:v>
+                </c:pt>
+                <c:pt idx="4">
+                  <c:v>65</c:v>
+                </c:pt>
+              </c:numCache>
+            </c:numRef>
+          </c:val>
+        </c:ser>
+        <c:ser>
+          <c:idx val="1"/>
+          <c:order val="1"/>
+          <c:tx>
+            <c:strRef>
+              <c:f>Sheet1!$C$1</c:f>
+              <c:strCache>
+                <c:ptCount val="1"/>
+                <c:pt idx="0">
+                  <c:v># of Iterations</c:v>
+                </c:pt>
+              </c:strCache>
+            </c:strRef>
+          </c:tx>
+          <c:invertIfNegative val="0"/>
+          <c:cat>
+            <c:strRef>
+              <c:f>Sheet1!$A$2:$A$6</c:f>
+              <c:strCache>
+                <c:ptCount val="5"/>
+                <c:pt idx="0">
+                  <c:v>Set 1</c:v>
+                </c:pt>
+                <c:pt idx="1">
+                  <c:v>Set 2</c:v>
+                </c:pt>
+                <c:pt idx="2">
+                  <c:v>Set 3</c:v>
+                </c:pt>
+                <c:pt idx="3">
+                  <c:v>Set 4</c:v>
+                </c:pt>
+                <c:pt idx="4">
+                  <c:v>Set 5</c:v>
+                </c:pt>
+              </c:strCache>
+            </c:strRef>
+          </c:cat>
+          <c:val>
+            <c:numRef>
+              <c:f>Sheet1!$C$2:$C$6</c:f>
+              <c:numCache>
+                <c:formatCode>General</c:formatCode>
+                <c:ptCount val="5"/>
+                <c:pt idx="0">
+                  <c:v>29</c:v>
+                </c:pt>
+                <c:pt idx="1">
+                  <c:v>29</c:v>
+                </c:pt>
+                <c:pt idx="2">
+                  <c:v>45</c:v>
+                </c:pt>
+                <c:pt idx="3">
+                  <c:v>30</c:v>
+                </c:pt>
+                <c:pt idx="4">
+                  <c:v>29</c:v>
+                </c:pt>
+              </c:numCache>
+            </c:numRef>
+          </c:val>
+        </c:ser>
+        <c:dLbls>
+          <c:showLegendKey val="0"/>
+          <c:showVal val="1"/>
+          <c:showCatName val="0"/>
+          <c:showSerName val="0"/>
+          <c:showPercent val="0"/>
+          <c:showBubbleSize val="0"/>
+        </c:dLbls>
+        <c:gapWidth val="75"/>
+        <c:axId val="87051264"/>
+        <c:axId val="91184512"/>
+      </c:barChart>
+      <c:catAx>
+        <c:axId val="87051264"/>
+        <c:scaling>
+          <c:orientation val="minMax"/>
+        </c:scaling>
+        <c:delete val="0"/>
+        <c:axPos val="b"/>
+        <c:majorTickMark val="none"/>
+        <c:minorTickMark val="none"/>
+        <c:tickLblPos val="nextTo"/>
+        <c:crossAx val="91184512"/>
+        <c:crosses val="autoZero"/>
+        <c:auto val="1"/>
+        <c:lblAlgn val="ctr"/>
+        <c:lblOffset val="100"/>
+        <c:noMultiLvlLbl val="0"/>
+      </c:catAx>
+      <c:valAx>
+        <c:axId val="91184512"/>
+        <c:scaling>
+          <c:orientation val="minMax"/>
+        </c:scaling>
+        <c:delete val="0"/>
+        <c:axPos val="l"/>
+        <c:numFmt formatCode="General" sourceLinked="1"/>
+        <c:majorTickMark val="none"/>
+        <c:minorTickMark val="none"/>
+        <c:tickLblPos val="nextTo"/>
+        <c:crossAx val="87051264"/>
+        <c:crosses val="autoZero"/>
+        <c:crossBetween val="between"/>
+      </c:valAx>
+    </c:plotArea>
+    <c:legend>
+      <c:legendPos val="b"/>
+      <c:layout/>
+      <c:overlay val="0"/>
+    </c:legend>
+    <c:plotVisOnly val="1"/>
+    <c:dispBlanksAs val="gap"/>
+    <c:showDLblsOverMax val="0"/>
+  </c:chart>
+  <c:txPr>
+    <a:bodyPr/>
+    <a:lstStyle/>
+    <a:p>
+      <a:pPr>
+        <a:defRPr sz="1800"/>
+      </a:pPr>
+      <a:endParaRPr lang="en-US"/>
+    </a:p>
+  </c:txPr>
+  <c:externalData r:id="rId1">
+    <c:autoUpdate val="0"/>
+  </c:externalData>
+</c:chartSpace>
+</file>
+
+<file path=ppt/charts/chart3.xml><?xml version="1.0" encoding="utf-8"?>
+<c:chartSpace xmlns:c="http://schemas.openxmlformats.org/drawingml/2006/chart" xmlns:a="http://schemas.openxmlformats.org/drawingml/2006/main" xmlns:r="http://schemas.openxmlformats.org/officeDocument/2006/relationships">
+  <c:date1904 val="0"/>
+  <c:lang val="en-IN"/>
+  <c:roundedCorners val="0"/>
+  <mc:AlternateContent xmlns:mc="http://schemas.openxmlformats.org/markup-compatibility/2006">
+    <mc:Choice xmlns:c14="http://schemas.microsoft.com/office/drawing/2007/8/2/chart" Requires="c14">
+      <c14:style val="102"/>
+    </mc:Choice>
+    <mc:Fallback>
+      <c:style val="2"/>
+    </mc:Fallback>
+  </mc:AlternateContent>
+  <c:chart>
+    <c:title>
+      <c:layout/>
+      <c:overlay val="0"/>
+    </c:title>
+    <c:autoTitleDeleted val="0"/>
+    <c:plotArea>
+      <c:layout/>
+      <c:barChart>
+        <c:barDir val="col"/>
+        <c:grouping val="clustered"/>
+        <c:varyColors val="0"/>
+        <c:ser>
+          <c:idx val="0"/>
+          <c:order val="0"/>
+          <c:tx>
+            <c:strRef>
+              <c:f>Sheet1!$B$1</c:f>
+              <c:strCache>
+                <c:ptCount val="1"/>
+                <c:pt idx="0">
+                  <c:v>Accuracy</c:v>
+                </c:pt>
+              </c:strCache>
+            </c:strRef>
+          </c:tx>
+          <c:invertIfNegative val="0"/>
+          <c:cat>
+            <c:strRef>
+              <c:f>Sheet1!$A$2:$A$6</c:f>
+              <c:strCache>
+                <c:ptCount val="5"/>
+                <c:pt idx="0">
+                  <c:v>Set 1</c:v>
+                </c:pt>
+                <c:pt idx="1">
+                  <c:v>Set 2</c:v>
+                </c:pt>
+                <c:pt idx="2">
+                  <c:v>Set 3</c:v>
+                </c:pt>
+                <c:pt idx="3">
+                  <c:v>Set 4</c:v>
+                </c:pt>
+                <c:pt idx="4">
+                  <c:v>Set 5</c:v>
+                </c:pt>
+              </c:strCache>
+            </c:strRef>
+          </c:cat>
+          <c:val>
+            <c:numRef>
+              <c:f>Sheet1!$B$2:$B$6</c:f>
+              <c:numCache>
+                <c:formatCode>General</c:formatCode>
+                <c:ptCount val="5"/>
+                <c:pt idx="0">
+                  <c:v>90</c:v>
+                </c:pt>
+                <c:pt idx="1">
+                  <c:v>100</c:v>
+                </c:pt>
+                <c:pt idx="2">
+                  <c:v>90</c:v>
+                </c:pt>
+                <c:pt idx="3">
+                  <c:v>86.66</c:v>
+                </c:pt>
+                <c:pt idx="4">
+                  <c:v>93.33</c:v>
+                </c:pt>
+              </c:numCache>
+            </c:numRef>
+          </c:val>
+        </c:ser>
+        <c:dLbls>
+          <c:showLegendKey val="0"/>
+          <c:showVal val="1"/>
+          <c:showCatName val="0"/>
+          <c:showSerName val="0"/>
+          <c:showPercent val="0"/>
+          <c:showBubbleSize val="0"/>
+        </c:dLbls>
+        <c:gapWidth val="75"/>
+        <c:axId val="83803136"/>
+        <c:axId val="84849408"/>
+      </c:barChart>
+      <c:catAx>
+        <c:axId val="83803136"/>
+        <c:scaling>
+          <c:orientation val="minMax"/>
+        </c:scaling>
+        <c:delete val="0"/>
+        <c:axPos val="b"/>
+        <c:majorTickMark val="none"/>
+        <c:minorTickMark val="none"/>
+        <c:tickLblPos val="nextTo"/>
+        <c:crossAx val="84849408"/>
+        <c:crosses val="autoZero"/>
+        <c:auto val="1"/>
+        <c:lblAlgn val="ctr"/>
+        <c:lblOffset val="100"/>
+        <c:noMultiLvlLbl val="0"/>
+      </c:catAx>
+      <c:valAx>
+        <c:axId val="84849408"/>
+        <c:scaling>
+          <c:orientation val="minMax"/>
+        </c:scaling>
+        <c:delete val="0"/>
+        <c:axPos val="l"/>
+        <c:numFmt formatCode="General" sourceLinked="1"/>
+        <c:majorTickMark val="none"/>
+        <c:minorTickMark val="none"/>
+        <c:tickLblPos val="nextTo"/>
+        <c:crossAx val="83803136"/>
+        <c:crosses val="autoZero"/>
+        <c:crossBetween val="between"/>
+      </c:valAx>
+    </c:plotArea>
+    <c:legend>
+      <c:legendPos val="b"/>
+      <c:layout/>
+      <c:overlay val="0"/>
+    </c:legend>
+    <c:plotVisOnly val="1"/>
+    <c:dispBlanksAs val="gap"/>
+    <c:showDLblsOverMax val="0"/>
+  </c:chart>
+  <c:txPr>
+    <a:bodyPr/>
+    <a:lstStyle/>
+    <a:p>
+      <a:pPr>
+        <a:defRPr sz="1800"/>
+      </a:pPr>
+      <a:endParaRPr lang="en-US"/>
+    </a:p>
+  </c:txPr>
+  <c:externalData r:id="rId1">
+    <c:autoUpdate val="0"/>
+  </c:externalData>
+</c:chartSpace>
+</file>
+
+<file path=ppt/charts/chart4.xml><?xml version="1.0" encoding="utf-8"?>
+<c:chartSpace xmlns:c="http://schemas.openxmlformats.org/drawingml/2006/chart" xmlns:a="http://schemas.openxmlformats.org/drawingml/2006/main" xmlns:r="http://schemas.openxmlformats.org/officeDocument/2006/relationships">
+  <c:date1904 val="0"/>
+  <c:lang val="en-IN"/>
+  <c:roundedCorners val="0"/>
+  <mc:AlternateContent xmlns:mc="http://schemas.openxmlformats.org/markup-compatibility/2006">
+    <mc:Choice xmlns:c14="http://schemas.microsoft.com/office/drawing/2007/8/2/chart" Requires="c14">
+      <c14:style val="102"/>
+    </mc:Choice>
+    <mc:Fallback>
+      <c:style val="2"/>
+    </mc:Fallback>
+  </mc:AlternateContent>
+  <c:chart>
+    <c:title>
+      <c:layout/>
+      <c:overlay val="0"/>
+    </c:title>
+    <c:autoTitleDeleted val="0"/>
+    <c:plotArea>
+      <c:layout/>
+      <c:barChart>
+        <c:barDir val="col"/>
+        <c:grouping val="clustered"/>
+        <c:varyColors val="0"/>
+        <c:ser>
+          <c:idx val="0"/>
+          <c:order val="0"/>
+          <c:tx>
+            <c:strRef>
+              <c:f>Sheet1!$B$1</c:f>
+              <c:strCache>
+                <c:ptCount val="1"/>
+                <c:pt idx="0">
+                  <c:v># of Iterations</c:v>
+                </c:pt>
+              </c:strCache>
+            </c:strRef>
+          </c:tx>
+          <c:invertIfNegative val="0"/>
+          <c:cat>
+            <c:strRef>
+              <c:f>Sheet1!$A$2:$A$6</c:f>
+              <c:strCache>
+                <c:ptCount val="5"/>
+                <c:pt idx="0">
+                  <c:v>Set 1</c:v>
+                </c:pt>
+                <c:pt idx="1">
+                  <c:v>Set 2</c:v>
+                </c:pt>
+                <c:pt idx="2">
+                  <c:v>Set 3</c:v>
+                </c:pt>
+                <c:pt idx="3">
+                  <c:v>Set 4</c:v>
+                </c:pt>
+                <c:pt idx="4">
+                  <c:v>Set 5</c:v>
+                </c:pt>
+              </c:strCache>
+            </c:strRef>
+          </c:cat>
+          <c:val>
+            <c:numRef>
+              <c:f>Sheet1!$B$2:$B$6</c:f>
+              <c:numCache>
+                <c:formatCode>General</c:formatCode>
+                <c:ptCount val="5"/>
+                <c:pt idx="0">
+                  <c:v>22956</c:v>
+                </c:pt>
+                <c:pt idx="1">
+                  <c:v>58796</c:v>
+                </c:pt>
+                <c:pt idx="2">
+                  <c:v>16551</c:v>
+                </c:pt>
+                <c:pt idx="3">
+                  <c:v>69040</c:v>
+                </c:pt>
+                <c:pt idx="4">
+                  <c:v>23832</c:v>
+                </c:pt>
+              </c:numCache>
+            </c:numRef>
+          </c:val>
+        </c:ser>
+        <c:dLbls>
+          <c:showLegendKey val="0"/>
+          <c:showVal val="1"/>
+          <c:showCatName val="0"/>
+          <c:showSerName val="0"/>
+          <c:showPercent val="0"/>
+          <c:showBubbleSize val="0"/>
+        </c:dLbls>
+        <c:gapWidth val="75"/>
+        <c:axId val="114988928"/>
+        <c:axId val="115165440"/>
+      </c:barChart>
+      <c:catAx>
+        <c:axId val="114988928"/>
+        <c:scaling>
+          <c:orientation val="minMax"/>
+        </c:scaling>
+        <c:delete val="0"/>
+        <c:axPos val="b"/>
+        <c:majorTickMark val="none"/>
+        <c:minorTickMark val="none"/>
+        <c:tickLblPos val="nextTo"/>
+        <c:crossAx val="115165440"/>
+        <c:crosses val="autoZero"/>
+        <c:auto val="1"/>
+        <c:lblAlgn val="ctr"/>
+        <c:lblOffset val="100"/>
+        <c:noMultiLvlLbl val="0"/>
+      </c:catAx>
+      <c:valAx>
+        <c:axId val="115165440"/>
+        <c:scaling>
+          <c:orientation val="minMax"/>
+        </c:scaling>
+        <c:delete val="0"/>
+        <c:axPos val="l"/>
+        <c:numFmt formatCode="General" sourceLinked="1"/>
+        <c:majorTickMark val="none"/>
+        <c:minorTickMark val="none"/>
+        <c:tickLblPos val="nextTo"/>
+        <c:crossAx val="114988928"/>
+        <c:crosses val="autoZero"/>
+        <c:crossBetween val="between"/>
+      </c:valAx>
+    </c:plotArea>
+    <c:legend>
+      <c:legendPos val="b"/>
+      <c:layout/>
+      <c:overlay val="0"/>
+    </c:legend>
+    <c:plotVisOnly val="1"/>
+    <c:dispBlanksAs val="gap"/>
+    <c:showDLblsOverMax val="0"/>
+  </c:chart>
+  <c:txPr>
+    <a:bodyPr/>
+    <a:lstStyle/>
+    <a:p>
+      <a:pPr>
+        <a:defRPr sz="1800"/>
+      </a:pPr>
+      <a:endParaRPr lang="en-US"/>
+    </a:p>
+  </c:txPr>
+  <c:externalData r:id="rId1">
+    <c:autoUpdate val="0"/>
+  </c:externalData>
+</c:chartSpace>
+</file>
+
+<file path=ppt/charts/chart5.xml><?xml version="1.0" encoding="utf-8"?>
+<c:chartSpace xmlns:c="http://schemas.openxmlformats.org/drawingml/2006/chart" xmlns:a="http://schemas.openxmlformats.org/drawingml/2006/main" xmlns:r="http://schemas.openxmlformats.org/officeDocument/2006/relationships">
+  <c:date1904 val="0"/>
+  <c:lang val="en-IN"/>
+  <c:roundedCorners val="0"/>
+  <mc:AlternateContent xmlns:mc="http://schemas.openxmlformats.org/markup-compatibility/2006">
+    <mc:Choice xmlns:c14="http://schemas.microsoft.com/office/drawing/2007/8/2/chart" Requires="c14">
+      <c14:style val="102"/>
+    </mc:Choice>
+    <mc:Fallback>
+      <c:style val="2"/>
+    </mc:Fallback>
+  </mc:AlternateContent>
+  <c:chart>
+    <c:title>
+      <c:layout/>
+      <c:overlay val="0"/>
+    </c:title>
+    <c:autoTitleDeleted val="0"/>
+    <c:plotArea>
+      <c:layout/>
+      <c:barChart>
+        <c:barDir val="col"/>
+        <c:grouping val="clustered"/>
+        <c:varyColors val="0"/>
+        <c:ser>
+          <c:idx val="0"/>
+          <c:order val="0"/>
+          <c:tx>
+            <c:strRef>
+              <c:f>Sheet1!$B$1</c:f>
+              <c:strCache>
+                <c:ptCount val="1"/>
+                <c:pt idx="0">
+                  <c:v>Accuracy</c:v>
+                </c:pt>
+              </c:strCache>
+            </c:strRef>
+          </c:tx>
+          <c:invertIfNegative val="0"/>
+          <c:cat>
+            <c:strRef>
+              <c:f>Sheet1!$A$2:$A$4</c:f>
+              <c:strCache>
+                <c:ptCount val="3"/>
+                <c:pt idx="0">
+                  <c:v>MONK-1</c:v>
+                </c:pt>
+                <c:pt idx="1">
+                  <c:v>MONK-2</c:v>
+                </c:pt>
+                <c:pt idx="2">
+                  <c:v>MONK-3</c:v>
+                </c:pt>
+              </c:strCache>
+            </c:strRef>
+          </c:cat>
+          <c:val>
+            <c:numRef>
+              <c:f>Sheet1!$B$2:$B$4</c:f>
+              <c:numCache>
+                <c:formatCode>General</c:formatCode>
+                <c:ptCount val="3"/>
+                <c:pt idx="0">
+                  <c:v>100</c:v>
+                </c:pt>
+                <c:pt idx="1">
+                  <c:v>80.09</c:v>
+                </c:pt>
+                <c:pt idx="2">
+                  <c:v>87.04</c:v>
+                </c:pt>
+              </c:numCache>
+            </c:numRef>
+          </c:val>
+        </c:ser>
+        <c:dLbls>
+          <c:showLegendKey val="0"/>
+          <c:showVal val="1"/>
+          <c:showCatName val="0"/>
+          <c:showSerName val="0"/>
+          <c:showPercent val="0"/>
+          <c:showBubbleSize val="0"/>
+        </c:dLbls>
+        <c:gapWidth val="75"/>
+        <c:axId val="84655488"/>
+        <c:axId val="87033344"/>
+      </c:barChart>
+      <c:catAx>
+        <c:axId val="84655488"/>
+        <c:scaling>
+          <c:orientation val="minMax"/>
+        </c:scaling>
+        <c:delete val="0"/>
+        <c:axPos val="b"/>
+        <c:majorTickMark val="none"/>
+        <c:minorTickMark val="none"/>
+        <c:tickLblPos val="nextTo"/>
+        <c:crossAx val="87033344"/>
+        <c:crosses val="autoZero"/>
+        <c:auto val="1"/>
+        <c:lblAlgn val="ctr"/>
+        <c:lblOffset val="100"/>
+        <c:noMultiLvlLbl val="0"/>
+      </c:catAx>
+      <c:valAx>
+        <c:axId val="87033344"/>
+        <c:scaling>
+          <c:orientation val="minMax"/>
+        </c:scaling>
+        <c:delete val="0"/>
+        <c:axPos val="l"/>
+        <c:numFmt formatCode="General" sourceLinked="1"/>
+        <c:majorTickMark val="none"/>
+        <c:minorTickMark val="none"/>
+        <c:tickLblPos val="nextTo"/>
+        <c:crossAx val="84655488"/>
+        <c:crosses val="autoZero"/>
+        <c:crossBetween val="between"/>
+      </c:valAx>
+    </c:plotArea>
+    <c:legend>
+      <c:legendPos val="b"/>
+      <c:layout/>
+      <c:overlay val="0"/>
+    </c:legend>
+    <c:plotVisOnly val="1"/>
+    <c:dispBlanksAs val="gap"/>
+    <c:showDLblsOverMax val="0"/>
+  </c:chart>
+  <c:txPr>
+    <a:bodyPr/>
+    <a:lstStyle/>
+    <a:p>
+      <a:pPr>
+        <a:defRPr sz="1800"/>
+      </a:pPr>
+      <a:endParaRPr lang="en-US"/>
+    </a:p>
+  </c:txPr>
+  <c:externalData r:id="rId1">
+    <c:autoUpdate val="0"/>
+  </c:externalData>
+</c:chartSpace>
+</file>
+
+<file path=ppt/charts/chart6.xml><?xml version="1.0" encoding="utf-8"?>
+<c:chartSpace xmlns:c="http://schemas.openxmlformats.org/drawingml/2006/chart" xmlns:a="http://schemas.openxmlformats.org/drawingml/2006/main" xmlns:r="http://schemas.openxmlformats.org/officeDocument/2006/relationships">
+  <c:date1904 val="0"/>
+  <c:lang val="en-IN"/>
+  <c:roundedCorners val="0"/>
+  <mc:AlternateContent xmlns:mc="http://schemas.openxmlformats.org/markup-compatibility/2006">
+    <mc:Choice xmlns:c14="http://schemas.microsoft.com/office/drawing/2007/8/2/chart" Requires="c14">
+      <c14:style val="102"/>
+    </mc:Choice>
+    <mc:Fallback>
+      <c:style val="2"/>
+    </mc:Fallback>
+  </mc:AlternateContent>
+  <c:chart>
+    <c:title>
+      <c:layout/>
+      <c:overlay val="0"/>
+    </c:title>
+    <c:autoTitleDeleted val="0"/>
+    <c:plotArea>
+      <c:layout/>
+      <c:barChart>
+        <c:barDir val="col"/>
+        <c:grouping val="clustered"/>
+        <c:varyColors val="0"/>
+        <c:ser>
+          <c:idx val="0"/>
+          <c:order val="0"/>
+          <c:tx>
+            <c:strRef>
+              <c:f>Sheet1!$B$1</c:f>
+              <c:strCache>
+                <c:ptCount val="1"/>
+                <c:pt idx="0">
+                  <c:v># of Iterations</c:v>
+                </c:pt>
+              </c:strCache>
+            </c:strRef>
+          </c:tx>
+          <c:invertIfNegative val="0"/>
+          <c:cat>
+            <c:strRef>
+              <c:f>Sheet1!$A$2:$A$4</c:f>
+              <c:strCache>
+                <c:ptCount val="3"/>
+                <c:pt idx="0">
+                  <c:v>MONK-1</c:v>
+                </c:pt>
+                <c:pt idx="1">
+                  <c:v>MONK-2</c:v>
+                </c:pt>
+                <c:pt idx="2">
+                  <c:v>MONK-3</c:v>
+                </c:pt>
+              </c:strCache>
+            </c:strRef>
+          </c:cat>
+          <c:val>
+            <c:numRef>
+              <c:f>Sheet1!$B$2:$B$4</c:f>
+              <c:numCache>
+                <c:formatCode>General</c:formatCode>
+                <c:ptCount val="3"/>
+                <c:pt idx="0">
+                  <c:v>274</c:v>
+                </c:pt>
+                <c:pt idx="1">
+                  <c:v>3829</c:v>
+                </c:pt>
+                <c:pt idx="2">
+                  <c:v>499</c:v>
+                </c:pt>
+              </c:numCache>
+            </c:numRef>
+          </c:val>
+        </c:ser>
+        <c:dLbls>
+          <c:showLegendKey val="0"/>
+          <c:showVal val="1"/>
+          <c:showCatName val="0"/>
+          <c:showSerName val="0"/>
+          <c:showPercent val="0"/>
+          <c:showBubbleSize val="0"/>
+        </c:dLbls>
+        <c:gapWidth val="75"/>
+        <c:axId val="111291776"/>
+        <c:axId val="111331584"/>
+      </c:barChart>
+      <c:catAx>
+        <c:axId val="111291776"/>
+        <c:scaling>
+          <c:orientation val="minMax"/>
+        </c:scaling>
+        <c:delete val="0"/>
+        <c:axPos val="b"/>
+        <c:majorTickMark val="none"/>
+        <c:minorTickMark val="none"/>
+        <c:tickLblPos val="nextTo"/>
+        <c:crossAx val="111331584"/>
+        <c:crosses val="autoZero"/>
+        <c:auto val="1"/>
+        <c:lblAlgn val="ctr"/>
+        <c:lblOffset val="100"/>
+        <c:noMultiLvlLbl val="0"/>
+      </c:catAx>
+      <c:valAx>
+        <c:axId val="111331584"/>
+        <c:scaling>
+          <c:orientation val="minMax"/>
+        </c:scaling>
+        <c:delete val="0"/>
+        <c:axPos val="l"/>
+        <c:numFmt formatCode="General" sourceLinked="1"/>
+        <c:majorTickMark val="none"/>
+        <c:minorTickMark val="none"/>
+        <c:tickLblPos val="nextTo"/>
+        <c:crossAx val="111291776"/>
+        <c:crosses val="autoZero"/>
+        <c:crossBetween val="between"/>
+      </c:valAx>
+    </c:plotArea>
+    <c:legend>
+      <c:legendPos val="b"/>
+      <c:layout/>
+      <c:overlay val="0"/>
+    </c:legend>
+    <c:plotVisOnly val="1"/>
+    <c:dispBlanksAs val="gap"/>
+    <c:showDLblsOverMax val="0"/>
+  </c:chart>
+  <c:txPr>
+    <a:bodyPr/>
+    <a:lstStyle/>
+    <a:p>
+      <a:pPr>
+        <a:defRPr sz="1800"/>
+      </a:pPr>
+      <a:endParaRPr lang="en-US"/>
+    </a:p>
+  </c:txPr>
+  <c:externalData r:id="rId1">
+    <c:autoUpdate val="0"/>
+  </c:externalData>
+</c:chartSpace>
+</file>
+
 <file path=ppt/slideLayouts/slideLayout1.xml><?xml version="1.0" encoding="utf-8"?>
 <p:sldLayout xmlns:a="http://schemas.openxmlformats.org/drawingml/2006/main" xmlns:r="http://schemas.openxmlformats.org/officeDocument/2006/relationships" xmlns:p="http://schemas.openxmlformats.org/presentationml/2006/main" showMasterSp="0" type="title" preserve="1">
   <p:cSld name="Title Slide">
@@ -278,7 +2595,7 @@
           <a:p>
             <a:fld id="{CFB5E580-610C-478E-87E4-2D004C324BCF}" type="datetimeFigureOut">
               <a:rPr lang="en-IN" smtClean="0"/>
-              <a:t>11-03-2014</a:t>
+              <a:t>16-04-2014</a:t>
             </a:fld>
             <a:endParaRPr lang="en-IN"/>
           </a:p>
@@ -637,7 +2954,7 @@
           <a:p>
             <a:fld id="{CFB5E580-610C-478E-87E4-2D004C324BCF}" type="datetimeFigureOut">
               <a:rPr lang="en-IN" smtClean="0"/>
-              <a:t>11-03-2014</a:t>
+              <a:t>16-04-2014</a:t>
             </a:fld>
             <a:endParaRPr lang="en-IN"/>
           </a:p>
@@ -812,7 +3129,7 @@
           <a:p>
             <a:fld id="{CFB5E580-610C-478E-87E4-2D004C324BCF}" type="datetimeFigureOut">
               <a:rPr lang="en-IN" smtClean="0"/>
-              <a:t>11-03-2014</a:t>
+              <a:t>16-04-2014</a:t>
             </a:fld>
             <a:endParaRPr lang="en-IN"/>
           </a:p>
@@ -1047,7 +3364,7 @@
           <a:p>
             <a:fld id="{CFB5E580-610C-478E-87E4-2D004C324BCF}" type="datetimeFigureOut">
               <a:rPr lang="en-IN" smtClean="0"/>
-              <a:t>11-03-2014</a:t>
+              <a:t>16-04-2014</a:t>
             </a:fld>
             <a:endParaRPr lang="en-IN"/>
           </a:p>
@@ -1316,7 +3633,7 @@
           <a:p>
             <a:fld id="{CFB5E580-610C-478E-87E4-2D004C324BCF}" type="datetimeFigureOut">
               <a:rPr lang="en-IN" smtClean="0"/>
-              <a:t>11-03-2014</a:t>
+              <a:t>16-04-2014</a:t>
             </a:fld>
             <a:endParaRPr lang="en-IN"/>
           </a:p>
@@ -1536,7 +3853,7 @@
           <a:p>
             <a:fld id="{CFB5E580-610C-478E-87E4-2D004C324BCF}" type="datetimeFigureOut">
               <a:rPr lang="en-IN" smtClean="0"/>
-              <a:t>11-03-2014</a:t>
+              <a:t>16-04-2014</a:t>
             </a:fld>
             <a:endParaRPr lang="en-IN"/>
           </a:p>
@@ -1888,7 +4205,7 @@
           <a:p>
             <a:fld id="{CFB5E580-610C-478E-87E4-2D004C324BCF}" type="datetimeFigureOut">
               <a:rPr lang="en-IN" smtClean="0"/>
-              <a:t>11-03-2014</a:t>
+              <a:t>16-04-2014</a:t>
             </a:fld>
             <a:endParaRPr lang="en-IN"/>
           </a:p>
@@ -2120,7 +4437,7 @@
           <a:p>
             <a:fld id="{CFB5E580-610C-478E-87E4-2D004C324BCF}" type="datetimeFigureOut">
               <a:rPr lang="en-IN" smtClean="0"/>
-              <a:t>11-03-2014</a:t>
+              <a:t>16-04-2014</a:t>
             </a:fld>
             <a:endParaRPr lang="en-IN"/>
           </a:p>
@@ -2260,7 +4577,7 @@
           <a:p>
             <a:fld id="{CFB5E580-610C-478E-87E4-2D004C324BCF}" type="datetimeFigureOut">
               <a:rPr lang="en-IN" smtClean="0"/>
-              <a:t>11-03-2014</a:t>
+              <a:t>16-04-2014</a:t>
             </a:fld>
             <a:endParaRPr lang="en-IN"/>
           </a:p>
@@ -2537,7 +4854,7 @@
           <a:p>
             <a:fld id="{CFB5E580-610C-478E-87E4-2D004C324BCF}" type="datetimeFigureOut">
               <a:rPr lang="en-IN" smtClean="0"/>
-              <a:t>11-03-2014</a:t>
+              <a:t>16-04-2014</a:t>
             </a:fld>
             <a:endParaRPr lang="en-IN"/>
           </a:p>
@@ -2944,7 +5261,7 @@
           <a:p>
             <a:fld id="{CFB5E580-610C-478E-87E4-2D004C324BCF}" type="datetimeFigureOut">
               <a:rPr lang="en-IN" smtClean="0"/>
-              <a:t>11-03-2014</a:t>
+              <a:t>16-04-2014</a:t>
             </a:fld>
             <a:endParaRPr lang="en-IN"/>
           </a:p>
@@ -3282,7 +5599,7 @@
           <a:p>
             <a:fld id="{CFB5E580-610C-478E-87E4-2D004C324BCF}" type="datetimeFigureOut">
               <a:rPr lang="en-IN" smtClean="0"/>
-              <a:t>11-03-2014</a:t>
+              <a:t>16-04-2014</a:t>
             </a:fld>
             <a:endParaRPr lang="en-IN"/>
           </a:p>
@@ -20310,6 +22627,1225 @@
 </p:sld>
 </file>
 
+<file path=ppt/slides/slide30.xml><?xml version="1.0" encoding="utf-8"?>
+<p:sld xmlns:a="http://schemas.openxmlformats.org/drawingml/2006/main" xmlns:r="http://schemas.openxmlformats.org/officeDocument/2006/relationships" xmlns:p="http://schemas.openxmlformats.org/presentationml/2006/main">
+  <p:cSld>
+    <p:spTree>
+      <p:nvGrpSpPr>
+        <p:cNvPr id="1" name=""/>
+        <p:cNvGrpSpPr/>
+        <p:nvPr/>
+      </p:nvGrpSpPr>
+      <p:grpSpPr>
+        <a:xfrm>
+          <a:off x="0" y="0"/>
+          <a:ext cx="0" cy="0"/>
+          <a:chOff x="0" y="0"/>
+          <a:chExt cx="0" cy="0"/>
+        </a:xfrm>
+      </p:grpSpPr>
+      <p:sp>
+        <p:nvSpPr>
+          <p:cNvPr id="2" name="Title 1"/>
+          <p:cNvSpPr>
+            <a:spLocks noGrp="1"/>
+          </p:cNvSpPr>
+          <p:nvPr>
+            <p:ph type="title"/>
+          </p:nvPr>
+        </p:nvSpPr>
+        <p:spPr/>
+        <p:txBody>
+          <a:bodyPr/>
+          <a:lstStyle/>
+          <a:p>
+            <a:r>
+              <a:rPr lang="en-US" dirty="0" smtClean="0"/>
+              <a:t>Twitter Sentiment Analysis</a:t>
+            </a:r>
+            <a:endParaRPr lang="en-IN" dirty="0"/>
+          </a:p>
+        </p:txBody>
+      </p:sp>
+      <p:sp>
+        <p:nvSpPr>
+          <p:cNvPr id="3" name="Content Placeholder 2"/>
+          <p:cNvSpPr>
+            <a:spLocks noGrp="1"/>
+          </p:cNvSpPr>
+          <p:nvPr>
+            <p:ph sz="quarter" idx="1"/>
+          </p:nvPr>
+        </p:nvSpPr>
+        <p:spPr/>
+        <p:txBody>
+          <a:bodyPr/>
+          <a:lstStyle/>
+          <a:p>
+            <a:r>
+              <a:rPr lang="en-US" dirty="0" smtClean="0"/>
+              <a:t>Feature Vector Extraction</a:t>
+            </a:r>
+          </a:p>
+          <a:p>
+            <a:pPr lvl="1"/>
+            <a:r>
+              <a:rPr lang="en-US" dirty="0" smtClean="0"/>
+              <a:t>Separate out the words from tweets.</a:t>
+            </a:r>
+          </a:p>
+          <a:p>
+            <a:pPr lvl="1"/>
+            <a:r>
+              <a:rPr lang="en-US" dirty="0" smtClean="0"/>
+              <a:t>Remove duplicate and unwanted words from the list using sorting and stemming.</a:t>
+            </a:r>
+          </a:p>
+          <a:p>
+            <a:pPr lvl="1"/>
+            <a:r>
+              <a:rPr lang="en-US" dirty="0" smtClean="0"/>
+              <a:t>Length of feature vector = # of words extracted</a:t>
+            </a:r>
+          </a:p>
+          <a:p>
+            <a:pPr lvl="1"/>
+            <a:r>
+              <a:rPr lang="en-US" dirty="0" smtClean="0"/>
+              <a:t>If the word is present in the tweet, set the value 1, else 0.</a:t>
+            </a:r>
+          </a:p>
+          <a:p>
+            <a:r>
+              <a:rPr lang="en-US" dirty="0" smtClean="0"/>
+              <a:t>Five Fold Cross Validation</a:t>
+            </a:r>
+            <a:endParaRPr lang="en-US" dirty="0" smtClean="0"/>
+          </a:p>
+          <a:p>
+            <a:pPr lvl="1"/>
+            <a:r>
+              <a:rPr lang="en-US" dirty="0" smtClean="0"/>
+              <a:t>Shuffle the input data(tweets).</a:t>
+            </a:r>
+          </a:p>
+          <a:p>
+            <a:pPr lvl="1"/>
+            <a:r>
+              <a:rPr lang="en-US" dirty="0" smtClean="0"/>
+              <a:t>Separate out the data into five sets.</a:t>
+            </a:r>
+          </a:p>
+          <a:p>
+            <a:pPr lvl="1"/>
+            <a:r>
+              <a:rPr lang="en-US" dirty="0" smtClean="0"/>
+              <a:t>At a time, four are used for training and the remaining one is used as validation set. </a:t>
+            </a:r>
+            <a:endParaRPr lang="en-US" dirty="0" smtClean="0"/>
+          </a:p>
+          <a:p>
+            <a:pPr lvl="1"/>
+            <a:endParaRPr lang="en-US" dirty="0"/>
+          </a:p>
+          <a:p>
+            <a:pPr lvl="1"/>
+            <a:endParaRPr lang="en-US" dirty="0" smtClean="0"/>
+          </a:p>
+        </p:txBody>
+      </p:sp>
+    </p:spTree>
+    <p:extLst>
+      <p:ext uri="{BB962C8B-B14F-4D97-AF65-F5344CB8AC3E}">
+        <p14:creationId xmlns:p14="http://schemas.microsoft.com/office/powerpoint/2010/main" val="1621692223"/>
+      </p:ext>
+    </p:extLst>
+  </p:cSld>
+  <p:clrMapOvr>
+    <a:masterClrMapping/>
+  </p:clrMapOvr>
+  <p:timing>
+    <p:tnLst>
+      <p:par>
+        <p:cTn id="1" dur="indefinite" restart="never" nodeType="tmRoot"/>
+      </p:par>
+    </p:tnLst>
+  </p:timing>
+</p:sld>
+</file>
+
+<file path=ppt/slides/slide31.xml><?xml version="1.0" encoding="utf-8"?>
+<p:sld xmlns:a="http://schemas.openxmlformats.org/drawingml/2006/main" xmlns:r="http://schemas.openxmlformats.org/officeDocument/2006/relationships" xmlns:p="http://schemas.openxmlformats.org/presentationml/2006/main">
+  <p:cSld>
+    <p:spTree>
+      <p:nvGrpSpPr>
+        <p:cNvPr id="1" name=""/>
+        <p:cNvGrpSpPr/>
+        <p:nvPr/>
+      </p:nvGrpSpPr>
+      <p:grpSpPr>
+        <a:xfrm>
+          <a:off x="0" y="0"/>
+          <a:ext cx="0" cy="0"/>
+          <a:chOff x="0" y="0"/>
+          <a:chExt cx="0" cy="0"/>
+        </a:xfrm>
+      </p:grpSpPr>
+      <p:sp>
+        <p:nvSpPr>
+          <p:cNvPr id="2" name="Title 1"/>
+          <p:cNvSpPr>
+            <a:spLocks noGrp="1"/>
+          </p:cNvSpPr>
+          <p:nvPr>
+            <p:ph type="title"/>
+          </p:nvPr>
+        </p:nvSpPr>
+        <p:spPr/>
+        <p:txBody>
+          <a:bodyPr/>
+          <a:lstStyle/>
+          <a:p>
+            <a:r>
+              <a:rPr lang="en-US" dirty="0" smtClean="0"/>
+              <a:t>Twitter Sentiment Analysis : Error v/s Iteration Number</a:t>
+            </a:r>
+            <a:endParaRPr lang="en-IN" dirty="0"/>
+          </a:p>
+        </p:txBody>
+      </p:sp>
+      <p:sp>
+        <p:nvSpPr>
+          <p:cNvPr id="5" name="Text Placeholder 4"/>
+          <p:cNvSpPr>
+            <a:spLocks noGrp="1"/>
+          </p:cNvSpPr>
+          <p:nvPr>
+            <p:ph type="body" idx="2"/>
+          </p:nvPr>
+        </p:nvSpPr>
+        <p:spPr/>
+        <p:txBody>
+          <a:bodyPr>
+            <a:normAutofit/>
+          </a:bodyPr>
+          <a:lstStyle/>
+          <a:p>
+            <a:r>
+              <a:rPr lang="en-US" sz="1800" dirty="0" smtClean="0"/>
+              <a:t>The graph represents the variation of error with the iteration number during the training phase. </a:t>
+            </a:r>
+          </a:p>
+          <a:p>
+            <a:r>
+              <a:rPr lang="en-US" sz="1800" dirty="0" smtClean="0"/>
+              <a:t>The error values are quite close for all the five folds.</a:t>
+            </a:r>
+            <a:endParaRPr lang="en-IN" sz="1800" dirty="0"/>
+          </a:p>
+        </p:txBody>
+      </p:sp>
+      <p:graphicFrame>
+        <p:nvGraphicFramePr>
+          <p:cNvPr id="6" name="Content Placeholder 5"/>
+          <p:cNvGraphicFramePr>
+            <a:graphicFrameLocks noGrp="1"/>
+          </p:cNvGraphicFramePr>
+          <p:nvPr>
+            <p:ph sz="quarter" idx="1"/>
+            <p:extLst>
+              <p:ext uri="{D42A27DB-BD31-4B8C-83A1-F6EECF244321}">
+                <p14:modId xmlns:p14="http://schemas.microsoft.com/office/powerpoint/2010/main" val="3286008672"/>
+              </p:ext>
+            </p:extLst>
+          </p:nvPr>
+        </p:nvGraphicFramePr>
+        <p:xfrm>
+          <a:off x="304800" y="304800"/>
+          <a:ext cx="5715000" cy="5715000"/>
+        </p:xfrm>
+        <a:graphic>
+          <a:graphicData uri="http://schemas.openxmlformats.org/drawingml/2006/chart">
+            <c:chart xmlns:c="http://schemas.openxmlformats.org/drawingml/2006/chart" xmlns:r="http://schemas.openxmlformats.org/officeDocument/2006/relationships" r:id="rId2"/>
+          </a:graphicData>
+        </a:graphic>
+      </p:graphicFrame>
+    </p:spTree>
+    <p:extLst>
+      <p:ext uri="{BB962C8B-B14F-4D97-AF65-F5344CB8AC3E}">
+        <p14:creationId xmlns:p14="http://schemas.microsoft.com/office/powerpoint/2010/main" val="2380645068"/>
+      </p:ext>
+    </p:extLst>
+  </p:cSld>
+  <p:clrMapOvr>
+    <a:masterClrMapping/>
+  </p:clrMapOvr>
+  <p:timing>
+    <p:tnLst>
+      <p:par>
+        <p:cTn id="1" dur="indefinite" restart="never" nodeType="tmRoot"/>
+      </p:par>
+    </p:tnLst>
+  </p:timing>
+</p:sld>
+</file>
+
+<file path=ppt/slides/slide32.xml><?xml version="1.0" encoding="utf-8"?>
+<p:sld xmlns:a="http://schemas.openxmlformats.org/drawingml/2006/main" xmlns:r="http://schemas.openxmlformats.org/officeDocument/2006/relationships" xmlns:p="http://schemas.openxmlformats.org/presentationml/2006/main">
+  <p:cSld>
+    <p:spTree>
+      <p:nvGrpSpPr>
+        <p:cNvPr id="1" name=""/>
+        <p:cNvGrpSpPr/>
+        <p:nvPr/>
+      </p:nvGrpSpPr>
+      <p:grpSpPr>
+        <a:xfrm>
+          <a:off x="0" y="0"/>
+          <a:ext cx="0" cy="0"/>
+          <a:chOff x="0" y="0"/>
+          <a:chExt cx="0" cy="0"/>
+        </a:xfrm>
+      </p:grpSpPr>
+      <p:sp>
+        <p:nvSpPr>
+          <p:cNvPr id="2" name="Title 1"/>
+          <p:cNvSpPr>
+            <a:spLocks noGrp="1"/>
+          </p:cNvSpPr>
+          <p:nvPr>
+            <p:ph type="title"/>
+          </p:nvPr>
+        </p:nvSpPr>
+        <p:spPr/>
+        <p:txBody>
+          <a:bodyPr/>
+          <a:lstStyle/>
+          <a:p>
+            <a:r>
+              <a:rPr lang="en-US" dirty="0" smtClean="0"/>
+              <a:t>Twitter Sentiment Analysis : Accuracy and Iterations</a:t>
+            </a:r>
+            <a:endParaRPr lang="en-IN" dirty="0"/>
+          </a:p>
+        </p:txBody>
+      </p:sp>
+      <p:sp>
+        <p:nvSpPr>
+          <p:cNvPr id="5" name="Text Placeholder 4"/>
+          <p:cNvSpPr>
+            <a:spLocks noGrp="1"/>
+          </p:cNvSpPr>
+          <p:nvPr>
+            <p:ph type="body" idx="2"/>
+          </p:nvPr>
+        </p:nvSpPr>
+        <p:spPr/>
+        <p:txBody>
+          <a:bodyPr>
+            <a:normAutofit/>
+          </a:bodyPr>
+          <a:lstStyle/>
+          <a:p>
+            <a:r>
+              <a:rPr lang="en-US" sz="1800" dirty="0" smtClean="0"/>
+              <a:t>The graph represents the accuracy on validation and # of iterations on convergence for five fold data. </a:t>
+            </a:r>
+          </a:p>
+          <a:p>
+            <a:r>
+              <a:rPr lang="en-US" sz="1800" dirty="0" smtClean="0"/>
+              <a:t>Average Accuracy = 64.25%</a:t>
+            </a:r>
+            <a:endParaRPr lang="en-IN" sz="1800" dirty="0"/>
+          </a:p>
+        </p:txBody>
+      </p:sp>
+      <p:graphicFrame>
+        <p:nvGraphicFramePr>
+          <p:cNvPr id="4" name="Content Placeholder 3"/>
+          <p:cNvGraphicFramePr>
+            <a:graphicFrameLocks noGrp="1"/>
+          </p:cNvGraphicFramePr>
+          <p:nvPr>
+            <p:ph sz="quarter" idx="1"/>
+            <p:extLst>
+              <p:ext uri="{D42A27DB-BD31-4B8C-83A1-F6EECF244321}">
+                <p14:modId xmlns:p14="http://schemas.microsoft.com/office/powerpoint/2010/main" val="2215825711"/>
+              </p:ext>
+            </p:extLst>
+          </p:nvPr>
+        </p:nvGraphicFramePr>
+        <p:xfrm>
+          <a:off x="304800" y="304800"/>
+          <a:ext cx="5715000" cy="5715000"/>
+        </p:xfrm>
+        <a:graphic>
+          <a:graphicData uri="http://schemas.openxmlformats.org/drawingml/2006/chart">
+            <c:chart xmlns:c="http://schemas.openxmlformats.org/drawingml/2006/chart" xmlns:r="http://schemas.openxmlformats.org/officeDocument/2006/relationships" r:id="rId2"/>
+          </a:graphicData>
+        </a:graphic>
+      </p:graphicFrame>
+    </p:spTree>
+    <p:extLst>
+      <p:ext uri="{BB962C8B-B14F-4D97-AF65-F5344CB8AC3E}">
+        <p14:creationId xmlns:p14="http://schemas.microsoft.com/office/powerpoint/2010/main" val="970387412"/>
+      </p:ext>
+    </p:extLst>
+  </p:cSld>
+  <p:clrMapOvr>
+    <a:masterClrMapping/>
+  </p:clrMapOvr>
+  <p:timing>
+    <p:tnLst>
+      <p:par>
+        <p:cTn id="1" dur="indefinite" restart="never" nodeType="tmRoot"/>
+      </p:par>
+    </p:tnLst>
+  </p:timing>
+</p:sld>
+</file>
+
+<file path=ppt/slides/slide33.xml><?xml version="1.0" encoding="utf-8"?>
+<p:sld xmlns:a="http://schemas.openxmlformats.org/drawingml/2006/main" xmlns:r="http://schemas.openxmlformats.org/officeDocument/2006/relationships" xmlns:p="http://schemas.openxmlformats.org/presentationml/2006/main">
+  <p:cSld>
+    <p:spTree>
+      <p:nvGrpSpPr>
+        <p:cNvPr id="1" name=""/>
+        <p:cNvGrpSpPr/>
+        <p:nvPr/>
+      </p:nvGrpSpPr>
+      <p:grpSpPr>
+        <a:xfrm>
+          <a:off x="0" y="0"/>
+          <a:ext cx="0" cy="0"/>
+          <a:chOff x="0" y="0"/>
+          <a:chExt cx="0" cy="0"/>
+        </a:xfrm>
+      </p:grpSpPr>
+      <p:sp>
+        <p:nvSpPr>
+          <p:cNvPr id="8" name="TextBox 7"/>
+          <p:cNvSpPr txBox="1"/>
+          <p:nvPr/>
+        </p:nvSpPr>
+        <p:spPr>
+          <a:xfrm>
+            <a:off x="1259632" y="1412776"/>
+            <a:ext cx="6120680" cy="3447098"/>
+          </a:xfrm>
+          <a:prstGeom prst="rect">
+            <a:avLst/>
+          </a:prstGeom>
+          <a:noFill/>
+        </p:spPr>
+        <p:txBody>
+          <a:bodyPr wrap="square" rtlCol="0">
+            <a:spAutoFit/>
+          </a:bodyPr>
+          <a:lstStyle/>
+          <a:p>
+            <a:r>
+              <a:rPr lang="en-US" sz="5000" dirty="0" smtClean="0">
+                <a:solidFill>
+                  <a:schemeClr val="accent1">
+                    <a:lumMod val="75000"/>
+                  </a:schemeClr>
+                </a:solidFill>
+                <a:latin typeface="+mj-lt"/>
+              </a:rPr>
+              <a:t>Back Propagation on Benchmark Data Sets : IRIS and MONK</a:t>
+            </a:r>
+            <a:endParaRPr lang="en-IN" sz="5000" dirty="0" smtClean="0">
+              <a:solidFill>
+                <a:schemeClr val="accent1">
+                  <a:lumMod val="75000"/>
+                </a:schemeClr>
+              </a:solidFill>
+              <a:latin typeface="+mj-lt"/>
+            </a:endParaRPr>
+          </a:p>
+          <a:p>
+            <a:endParaRPr lang="en-IN" dirty="0"/>
+          </a:p>
+        </p:txBody>
+      </p:sp>
+    </p:spTree>
+    <p:extLst>
+      <p:ext uri="{BB962C8B-B14F-4D97-AF65-F5344CB8AC3E}">
+        <p14:creationId xmlns:p14="http://schemas.microsoft.com/office/powerpoint/2010/main" val="3019937962"/>
+      </p:ext>
+    </p:extLst>
+  </p:cSld>
+  <p:clrMapOvr>
+    <a:masterClrMapping/>
+  </p:clrMapOvr>
+  <p:timing>
+    <p:tnLst>
+      <p:par>
+        <p:cTn id="1" dur="indefinite" restart="never" nodeType="tmRoot"/>
+      </p:par>
+    </p:tnLst>
+  </p:timing>
+</p:sld>
+</file>
+
+<file path=ppt/slides/slide34.xml><?xml version="1.0" encoding="utf-8"?>
+<p:sld xmlns:a="http://schemas.openxmlformats.org/drawingml/2006/main" xmlns:r="http://schemas.openxmlformats.org/officeDocument/2006/relationships" xmlns:p="http://schemas.openxmlformats.org/presentationml/2006/main">
+  <p:cSld>
+    <p:spTree>
+      <p:nvGrpSpPr>
+        <p:cNvPr id="1" name=""/>
+        <p:cNvGrpSpPr/>
+        <p:nvPr/>
+      </p:nvGrpSpPr>
+      <p:grpSpPr>
+        <a:xfrm>
+          <a:off x="0" y="0"/>
+          <a:ext cx="0" cy="0"/>
+          <a:chOff x="0" y="0"/>
+          <a:chExt cx="0" cy="0"/>
+        </a:xfrm>
+      </p:grpSpPr>
+      <p:sp>
+        <p:nvSpPr>
+          <p:cNvPr id="2" name="Title 1"/>
+          <p:cNvSpPr>
+            <a:spLocks noGrp="1"/>
+          </p:cNvSpPr>
+          <p:nvPr>
+            <p:ph type="title"/>
+          </p:nvPr>
+        </p:nvSpPr>
+        <p:spPr/>
+        <p:txBody>
+          <a:bodyPr/>
+          <a:lstStyle/>
+          <a:p>
+            <a:r>
+              <a:rPr lang="en-US" dirty="0" smtClean="0"/>
+              <a:t>FFNN Configuration : IRIS Data</a:t>
+            </a:r>
+            <a:endParaRPr lang="en-IN" dirty="0"/>
+          </a:p>
+        </p:txBody>
+      </p:sp>
+      <p:sp>
+        <p:nvSpPr>
+          <p:cNvPr id="3" name="Content Placeholder 2"/>
+          <p:cNvSpPr>
+            <a:spLocks noGrp="1"/>
+          </p:cNvSpPr>
+          <p:nvPr>
+            <p:ph sz="quarter" idx="1"/>
+          </p:nvPr>
+        </p:nvSpPr>
+        <p:spPr/>
+        <p:txBody>
+          <a:bodyPr/>
+          <a:lstStyle/>
+          <a:p>
+            <a:pPr lvl="1"/>
+            <a:r>
+              <a:rPr lang="en-US" dirty="0" smtClean="0"/>
+              <a:t># of inputs = 4</a:t>
+            </a:r>
+          </a:p>
+          <a:p>
+            <a:pPr lvl="1"/>
+            <a:r>
+              <a:rPr lang="en-US" dirty="0" smtClean="0"/>
+              <a:t># of hidden layers = 1 (with 10 neurons)</a:t>
+            </a:r>
+          </a:p>
+          <a:p>
+            <a:pPr lvl="1"/>
+            <a:r>
+              <a:rPr lang="en-US" dirty="0" smtClean="0"/>
+              <a:t># of outputs = 3</a:t>
+            </a:r>
+          </a:p>
+          <a:p>
+            <a:pPr lvl="1"/>
+            <a:r>
+              <a:rPr lang="en-US" dirty="0" smtClean="0"/>
+              <a:t>Learning Rate = 0.01</a:t>
+            </a:r>
+          </a:p>
+          <a:p>
+            <a:pPr lvl="1"/>
+            <a:r>
+              <a:rPr lang="en-US" dirty="0" smtClean="0"/>
+              <a:t>Momentum = 0.01</a:t>
+            </a:r>
+          </a:p>
+          <a:p>
+            <a:pPr lvl="1"/>
+            <a:r>
+              <a:rPr lang="en-US" dirty="0" smtClean="0"/>
+              <a:t>Size of training data = 150</a:t>
+            </a:r>
+            <a:endParaRPr lang="en-US" dirty="0" smtClean="0"/>
+          </a:p>
+        </p:txBody>
+      </p:sp>
+    </p:spTree>
+    <p:extLst>
+      <p:ext uri="{BB962C8B-B14F-4D97-AF65-F5344CB8AC3E}">
+        <p14:creationId xmlns:p14="http://schemas.microsoft.com/office/powerpoint/2010/main" val="3938662979"/>
+      </p:ext>
+    </p:extLst>
+  </p:cSld>
+  <p:clrMapOvr>
+    <a:masterClrMapping/>
+  </p:clrMapOvr>
+  <p:timing>
+    <p:tnLst>
+      <p:par>
+        <p:cTn id="1" dur="indefinite" restart="never" nodeType="tmRoot"/>
+      </p:par>
+    </p:tnLst>
+  </p:timing>
+</p:sld>
+</file>
+
+<file path=ppt/slides/slide35.xml><?xml version="1.0" encoding="utf-8"?>
+<p:sld xmlns:a="http://schemas.openxmlformats.org/drawingml/2006/main" xmlns:r="http://schemas.openxmlformats.org/officeDocument/2006/relationships" xmlns:p="http://schemas.openxmlformats.org/presentationml/2006/main">
+  <p:cSld>
+    <p:spTree>
+      <p:nvGrpSpPr>
+        <p:cNvPr id="1" name=""/>
+        <p:cNvGrpSpPr/>
+        <p:nvPr/>
+      </p:nvGrpSpPr>
+      <p:grpSpPr>
+        <a:xfrm>
+          <a:off x="0" y="0"/>
+          <a:ext cx="0" cy="0"/>
+          <a:chOff x="0" y="0"/>
+          <a:chExt cx="0" cy="0"/>
+        </a:xfrm>
+      </p:grpSpPr>
+      <p:sp>
+        <p:nvSpPr>
+          <p:cNvPr id="2" name="Title 1"/>
+          <p:cNvSpPr>
+            <a:spLocks noGrp="1"/>
+          </p:cNvSpPr>
+          <p:nvPr>
+            <p:ph type="title"/>
+          </p:nvPr>
+        </p:nvSpPr>
+        <p:spPr/>
+        <p:txBody>
+          <a:bodyPr/>
+          <a:lstStyle/>
+          <a:p>
+            <a:r>
+              <a:rPr lang="en-US" dirty="0" smtClean="0"/>
+              <a:t>IRIS Data</a:t>
+            </a:r>
+            <a:r>
+              <a:rPr lang="en-US" dirty="0" smtClean="0"/>
+              <a:t>: Accuracy</a:t>
+            </a:r>
+            <a:endParaRPr lang="en-IN" dirty="0"/>
+          </a:p>
+        </p:txBody>
+      </p:sp>
+      <p:sp>
+        <p:nvSpPr>
+          <p:cNvPr id="5" name="Text Placeholder 4"/>
+          <p:cNvSpPr>
+            <a:spLocks noGrp="1"/>
+          </p:cNvSpPr>
+          <p:nvPr>
+            <p:ph type="body" idx="2"/>
+          </p:nvPr>
+        </p:nvSpPr>
+        <p:spPr/>
+        <p:txBody>
+          <a:bodyPr>
+            <a:normAutofit/>
+          </a:bodyPr>
+          <a:lstStyle/>
+          <a:p>
+            <a:r>
+              <a:rPr lang="en-US" sz="1800" dirty="0" smtClean="0"/>
+              <a:t>The graph represents the accuracy on validation data sets for five fold IRIS data. </a:t>
+            </a:r>
+          </a:p>
+          <a:p>
+            <a:r>
+              <a:rPr lang="en-US" sz="1800" dirty="0" smtClean="0"/>
+              <a:t>Average Accuracy = 92.00%</a:t>
+            </a:r>
+            <a:endParaRPr lang="en-IN" sz="1800" dirty="0"/>
+          </a:p>
+        </p:txBody>
+      </p:sp>
+      <p:graphicFrame>
+        <p:nvGraphicFramePr>
+          <p:cNvPr id="4" name="Content Placeholder 3"/>
+          <p:cNvGraphicFramePr>
+            <a:graphicFrameLocks noGrp="1"/>
+          </p:cNvGraphicFramePr>
+          <p:nvPr>
+            <p:ph sz="quarter" idx="1"/>
+            <p:extLst>
+              <p:ext uri="{D42A27DB-BD31-4B8C-83A1-F6EECF244321}">
+                <p14:modId xmlns:p14="http://schemas.microsoft.com/office/powerpoint/2010/main" val="248110937"/>
+              </p:ext>
+            </p:extLst>
+          </p:nvPr>
+        </p:nvGraphicFramePr>
+        <p:xfrm>
+          <a:off x="304800" y="304800"/>
+          <a:ext cx="5715000" cy="5715000"/>
+        </p:xfrm>
+        <a:graphic>
+          <a:graphicData uri="http://schemas.openxmlformats.org/drawingml/2006/chart">
+            <c:chart xmlns:c="http://schemas.openxmlformats.org/drawingml/2006/chart" xmlns:r="http://schemas.openxmlformats.org/officeDocument/2006/relationships" r:id="rId2"/>
+          </a:graphicData>
+        </a:graphic>
+      </p:graphicFrame>
+    </p:spTree>
+    <p:extLst>
+      <p:ext uri="{BB962C8B-B14F-4D97-AF65-F5344CB8AC3E}">
+        <p14:creationId xmlns:p14="http://schemas.microsoft.com/office/powerpoint/2010/main" val="3464533577"/>
+      </p:ext>
+    </p:extLst>
+  </p:cSld>
+  <p:clrMapOvr>
+    <a:masterClrMapping/>
+  </p:clrMapOvr>
+  <p:timing>
+    <p:tnLst>
+      <p:par>
+        <p:cTn id="1" dur="indefinite" restart="never" nodeType="tmRoot"/>
+      </p:par>
+    </p:tnLst>
+  </p:timing>
+</p:sld>
+</file>
+
+<file path=ppt/slides/slide36.xml><?xml version="1.0" encoding="utf-8"?>
+<p:sld xmlns:a="http://schemas.openxmlformats.org/drawingml/2006/main" xmlns:r="http://schemas.openxmlformats.org/officeDocument/2006/relationships" xmlns:p="http://schemas.openxmlformats.org/presentationml/2006/main">
+  <p:cSld>
+    <p:spTree>
+      <p:nvGrpSpPr>
+        <p:cNvPr id="1" name=""/>
+        <p:cNvGrpSpPr/>
+        <p:nvPr/>
+      </p:nvGrpSpPr>
+      <p:grpSpPr>
+        <a:xfrm>
+          <a:off x="0" y="0"/>
+          <a:ext cx="0" cy="0"/>
+          <a:chOff x="0" y="0"/>
+          <a:chExt cx="0" cy="0"/>
+        </a:xfrm>
+      </p:grpSpPr>
+      <p:sp>
+        <p:nvSpPr>
+          <p:cNvPr id="2" name="Title 1"/>
+          <p:cNvSpPr>
+            <a:spLocks noGrp="1"/>
+          </p:cNvSpPr>
+          <p:nvPr>
+            <p:ph type="title"/>
+          </p:nvPr>
+        </p:nvSpPr>
+        <p:spPr/>
+        <p:txBody>
+          <a:bodyPr/>
+          <a:lstStyle/>
+          <a:p>
+            <a:r>
+              <a:rPr lang="en-US" dirty="0" smtClean="0"/>
+              <a:t>IRIS Data</a:t>
+            </a:r>
+            <a:r>
+              <a:rPr lang="en-US" dirty="0" smtClean="0"/>
+              <a:t>: # of Iterations</a:t>
+            </a:r>
+            <a:endParaRPr lang="en-IN" dirty="0"/>
+          </a:p>
+        </p:txBody>
+      </p:sp>
+      <p:sp>
+        <p:nvSpPr>
+          <p:cNvPr id="5" name="Text Placeholder 4"/>
+          <p:cNvSpPr>
+            <a:spLocks noGrp="1"/>
+          </p:cNvSpPr>
+          <p:nvPr>
+            <p:ph type="body" idx="2"/>
+          </p:nvPr>
+        </p:nvSpPr>
+        <p:spPr/>
+        <p:txBody>
+          <a:bodyPr>
+            <a:normAutofit/>
+          </a:bodyPr>
+          <a:lstStyle/>
+          <a:p>
+            <a:r>
+              <a:rPr lang="en-US" sz="1800" dirty="0" smtClean="0"/>
+              <a:t>The graph represents the # of iterations taken for convergence of five fold IRIS data. </a:t>
+            </a:r>
+          </a:p>
+        </p:txBody>
+      </p:sp>
+      <p:graphicFrame>
+        <p:nvGraphicFramePr>
+          <p:cNvPr id="4" name="Content Placeholder 3"/>
+          <p:cNvGraphicFramePr>
+            <a:graphicFrameLocks noGrp="1"/>
+          </p:cNvGraphicFramePr>
+          <p:nvPr>
+            <p:ph sz="quarter" idx="1"/>
+            <p:extLst>
+              <p:ext uri="{D42A27DB-BD31-4B8C-83A1-F6EECF244321}">
+                <p14:modId xmlns:p14="http://schemas.microsoft.com/office/powerpoint/2010/main" val="2586932278"/>
+              </p:ext>
+            </p:extLst>
+          </p:nvPr>
+        </p:nvGraphicFramePr>
+        <p:xfrm>
+          <a:off x="304800" y="304800"/>
+          <a:ext cx="5715000" cy="5715000"/>
+        </p:xfrm>
+        <a:graphic>
+          <a:graphicData uri="http://schemas.openxmlformats.org/drawingml/2006/chart">
+            <c:chart xmlns:c="http://schemas.openxmlformats.org/drawingml/2006/chart" xmlns:r="http://schemas.openxmlformats.org/officeDocument/2006/relationships" r:id="rId2"/>
+          </a:graphicData>
+        </a:graphic>
+      </p:graphicFrame>
+    </p:spTree>
+    <p:extLst>
+      <p:ext uri="{BB962C8B-B14F-4D97-AF65-F5344CB8AC3E}">
+        <p14:creationId xmlns:p14="http://schemas.microsoft.com/office/powerpoint/2010/main" val="2144424629"/>
+      </p:ext>
+    </p:extLst>
+  </p:cSld>
+  <p:clrMapOvr>
+    <a:masterClrMapping/>
+  </p:clrMapOvr>
+  <p:timing>
+    <p:tnLst>
+      <p:par>
+        <p:cTn id="1" dur="indefinite" restart="never" nodeType="tmRoot"/>
+      </p:par>
+    </p:tnLst>
+  </p:timing>
+</p:sld>
+</file>
+
+<file path=ppt/slides/slide37.xml><?xml version="1.0" encoding="utf-8"?>
+<p:sld xmlns:a="http://schemas.openxmlformats.org/drawingml/2006/main" xmlns:r="http://schemas.openxmlformats.org/officeDocument/2006/relationships" xmlns:p="http://schemas.openxmlformats.org/presentationml/2006/main">
+  <p:cSld>
+    <p:spTree>
+      <p:nvGrpSpPr>
+        <p:cNvPr id="1" name=""/>
+        <p:cNvGrpSpPr/>
+        <p:nvPr/>
+      </p:nvGrpSpPr>
+      <p:grpSpPr>
+        <a:xfrm>
+          <a:off x="0" y="0"/>
+          <a:ext cx="0" cy="0"/>
+          <a:chOff x="0" y="0"/>
+          <a:chExt cx="0" cy="0"/>
+        </a:xfrm>
+      </p:grpSpPr>
+      <p:sp>
+        <p:nvSpPr>
+          <p:cNvPr id="2" name="Title 1"/>
+          <p:cNvSpPr>
+            <a:spLocks noGrp="1"/>
+          </p:cNvSpPr>
+          <p:nvPr>
+            <p:ph type="title"/>
+          </p:nvPr>
+        </p:nvSpPr>
+        <p:spPr/>
+        <p:txBody>
+          <a:bodyPr/>
+          <a:lstStyle/>
+          <a:p>
+            <a:r>
+              <a:rPr lang="en-US" dirty="0" smtClean="0"/>
+              <a:t>FFNN Configuration : MONK Data</a:t>
+            </a:r>
+            <a:endParaRPr lang="en-IN" dirty="0"/>
+          </a:p>
+        </p:txBody>
+      </p:sp>
+      <p:sp>
+        <p:nvSpPr>
+          <p:cNvPr id="3" name="Content Placeholder 2"/>
+          <p:cNvSpPr>
+            <a:spLocks noGrp="1"/>
+          </p:cNvSpPr>
+          <p:nvPr>
+            <p:ph sz="quarter" idx="1"/>
+          </p:nvPr>
+        </p:nvSpPr>
+        <p:spPr/>
+        <p:txBody>
+          <a:bodyPr>
+            <a:normAutofit/>
+          </a:bodyPr>
+          <a:lstStyle/>
+          <a:p>
+            <a:r>
+              <a:rPr lang="en-US" dirty="0" smtClean="0"/>
+              <a:t># of inputs = 6</a:t>
+            </a:r>
+          </a:p>
+          <a:p>
+            <a:r>
+              <a:rPr lang="en-US" dirty="0" smtClean="0"/>
+              <a:t># of outputs = 1</a:t>
+            </a:r>
+          </a:p>
+          <a:p>
+            <a:r>
+              <a:rPr lang="en-US" dirty="0" smtClean="0"/>
+              <a:t>Learning Rate = 0.9</a:t>
+            </a:r>
+          </a:p>
+          <a:p>
+            <a:r>
+              <a:rPr lang="en-US" dirty="0" smtClean="0"/>
+              <a:t>Momentum = 0.0</a:t>
+            </a:r>
+          </a:p>
+          <a:p>
+            <a:r>
+              <a:rPr lang="en-US" dirty="0" smtClean="0"/>
+              <a:t>MONK-1</a:t>
+            </a:r>
+          </a:p>
+          <a:p>
+            <a:pPr lvl="1"/>
+            <a:r>
+              <a:rPr lang="en-US" dirty="0" smtClean="0"/>
+              <a:t># of hidden layers = 1( with 4 neurons)</a:t>
+            </a:r>
+            <a:endParaRPr lang="en-US" dirty="0" smtClean="0"/>
+          </a:p>
+          <a:p>
+            <a:r>
+              <a:rPr lang="en-US" dirty="0" smtClean="0"/>
+              <a:t>MONK-2</a:t>
+            </a:r>
+            <a:endParaRPr lang="en-US" dirty="0"/>
+          </a:p>
+          <a:p>
+            <a:pPr lvl="1"/>
+            <a:r>
+              <a:rPr lang="en-US" dirty="0"/>
+              <a:t># of hidden layers = 1( with </a:t>
+            </a:r>
+            <a:r>
+              <a:rPr lang="en-US" dirty="0" smtClean="0"/>
+              <a:t>20 </a:t>
+            </a:r>
+            <a:r>
+              <a:rPr lang="en-US" dirty="0"/>
+              <a:t>neurons</a:t>
+            </a:r>
+            <a:r>
+              <a:rPr lang="en-US" dirty="0" smtClean="0"/>
+              <a:t>)</a:t>
+            </a:r>
+            <a:endParaRPr lang="en-US" dirty="0" smtClean="0"/>
+          </a:p>
+          <a:p>
+            <a:r>
+              <a:rPr lang="en-US" dirty="0" smtClean="0"/>
+              <a:t>MONK-3</a:t>
+            </a:r>
+            <a:endParaRPr lang="en-US" dirty="0"/>
+          </a:p>
+          <a:p>
+            <a:pPr lvl="1"/>
+            <a:r>
+              <a:rPr lang="en-US" dirty="0"/>
+              <a:t># of hidden layers = 1( with </a:t>
+            </a:r>
+            <a:r>
+              <a:rPr lang="en-US" dirty="0" smtClean="0"/>
+              <a:t>7 </a:t>
+            </a:r>
+            <a:r>
+              <a:rPr lang="en-US" dirty="0"/>
+              <a:t>neurons)</a:t>
+            </a:r>
+          </a:p>
+          <a:p>
+            <a:pPr lvl="1"/>
+            <a:endParaRPr lang="en-US" dirty="0" smtClean="0"/>
+          </a:p>
+        </p:txBody>
+      </p:sp>
+    </p:spTree>
+    <p:extLst>
+      <p:ext uri="{BB962C8B-B14F-4D97-AF65-F5344CB8AC3E}">
+        <p14:creationId xmlns:p14="http://schemas.microsoft.com/office/powerpoint/2010/main" val="1348074792"/>
+      </p:ext>
+    </p:extLst>
+  </p:cSld>
+  <p:clrMapOvr>
+    <a:masterClrMapping/>
+  </p:clrMapOvr>
+  <p:timing>
+    <p:tnLst>
+      <p:par>
+        <p:cTn id="1" dur="indefinite" restart="never" nodeType="tmRoot"/>
+      </p:par>
+    </p:tnLst>
+  </p:timing>
+</p:sld>
+</file>
+
+<file path=ppt/slides/slide38.xml><?xml version="1.0" encoding="utf-8"?>
+<p:sld xmlns:a="http://schemas.openxmlformats.org/drawingml/2006/main" xmlns:r="http://schemas.openxmlformats.org/officeDocument/2006/relationships" xmlns:p="http://schemas.openxmlformats.org/presentationml/2006/main">
+  <p:cSld>
+    <p:spTree>
+      <p:nvGrpSpPr>
+        <p:cNvPr id="1" name=""/>
+        <p:cNvGrpSpPr/>
+        <p:nvPr/>
+      </p:nvGrpSpPr>
+      <p:grpSpPr>
+        <a:xfrm>
+          <a:off x="0" y="0"/>
+          <a:ext cx="0" cy="0"/>
+          <a:chOff x="0" y="0"/>
+          <a:chExt cx="0" cy="0"/>
+        </a:xfrm>
+      </p:grpSpPr>
+      <p:sp>
+        <p:nvSpPr>
+          <p:cNvPr id="2" name="Title 1"/>
+          <p:cNvSpPr>
+            <a:spLocks noGrp="1"/>
+          </p:cNvSpPr>
+          <p:nvPr>
+            <p:ph type="title"/>
+          </p:nvPr>
+        </p:nvSpPr>
+        <p:spPr/>
+        <p:txBody>
+          <a:bodyPr/>
+          <a:lstStyle/>
+          <a:p>
+            <a:r>
+              <a:rPr lang="en-US" dirty="0" smtClean="0"/>
+              <a:t>MONK Data</a:t>
+            </a:r>
+            <a:r>
+              <a:rPr lang="en-US" dirty="0" smtClean="0"/>
+              <a:t>: Accuracy</a:t>
+            </a:r>
+            <a:endParaRPr lang="en-IN" dirty="0"/>
+          </a:p>
+        </p:txBody>
+      </p:sp>
+      <p:sp>
+        <p:nvSpPr>
+          <p:cNvPr id="5" name="Text Placeholder 4"/>
+          <p:cNvSpPr>
+            <a:spLocks noGrp="1"/>
+          </p:cNvSpPr>
+          <p:nvPr>
+            <p:ph type="body" idx="2"/>
+          </p:nvPr>
+        </p:nvSpPr>
+        <p:spPr/>
+        <p:txBody>
+          <a:bodyPr>
+            <a:normAutofit/>
+          </a:bodyPr>
+          <a:lstStyle/>
+          <a:p>
+            <a:r>
+              <a:rPr lang="en-US" sz="1800" dirty="0" smtClean="0"/>
+              <a:t>The graph represents the accuracy on MONK data sets ( MONK-1, MONK-2, MONK-3)</a:t>
+            </a:r>
+          </a:p>
+        </p:txBody>
+      </p:sp>
+      <p:graphicFrame>
+        <p:nvGraphicFramePr>
+          <p:cNvPr id="4" name="Content Placeholder 3"/>
+          <p:cNvGraphicFramePr>
+            <a:graphicFrameLocks noGrp="1"/>
+          </p:cNvGraphicFramePr>
+          <p:nvPr>
+            <p:ph sz="quarter" idx="1"/>
+            <p:extLst>
+              <p:ext uri="{D42A27DB-BD31-4B8C-83A1-F6EECF244321}">
+                <p14:modId xmlns:p14="http://schemas.microsoft.com/office/powerpoint/2010/main" val="1307052775"/>
+              </p:ext>
+            </p:extLst>
+          </p:nvPr>
+        </p:nvGraphicFramePr>
+        <p:xfrm>
+          <a:off x="304800" y="304800"/>
+          <a:ext cx="5715000" cy="5715000"/>
+        </p:xfrm>
+        <a:graphic>
+          <a:graphicData uri="http://schemas.openxmlformats.org/drawingml/2006/chart">
+            <c:chart xmlns:c="http://schemas.openxmlformats.org/drawingml/2006/chart" xmlns:r="http://schemas.openxmlformats.org/officeDocument/2006/relationships" r:id="rId2"/>
+          </a:graphicData>
+        </a:graphic>
+      </p:graphicFrame>
+    </p:spTree>
+    <p:extLst>
+      <p:ext uri="{BB962C8B-B14F-4D97-AF65-F5344CB8AC3E}">
+        <p14:creationId xmlns:p14="http://schemas.microsoft.com/office/powerpoint/2010/main" val="599507431"/>
+      </p:ext>
+    </p:extLst>
+  </p:cSld>
+  <p:clrMapOvr>
+    <a:masterClrMapping/>
+  </p:clrMapOvr>
+  <p:timing>
+    <p:tnLst>
+      <p:par>
+        <p:cTn id="1" dur="indefinite" restart="never" nodeType="tmRoot"/>
+      </p:par>
+    </p:tnLst>
+  </p:timing>
+</p:sld>
+</file>
+
+<file path=ppt/slides/slide39.xml><?xml version="1.0" encoding="utf-8"?>
+<p:sld xmlns:a="http://schemas.openxmlformats.org/drawingml/2006/main" xmlns:r="http://schemas.openxmlformats.org/officeDocument/2006/relationships" xmlns:p="http://schemas.openxmlformats.org/presentationml/2006/main">
+  <p:cSld>
+    <p:spTree>
+      <p:nvGrpSpPr>
+        <p:cNvPr id="1" name=""/>
+        <p:cNvGrpSpPr/>
+        <p:nvPr/>
+      </p:nvGrpSpPr>
+      <p:grpSpPr>
+        <a:xfrm>
+          <a:off x="0" y="0"/>
+          <a:ext cx="0" cy="0"/>
+          <a:chOff x="0" y="0"/>
+          <a:chExt cx="0" cy="0"/>
+        </a:xfrm>
+      </p:grpSpPr>
+      <p:sp>
+        <p:nvSpPr>
+          <p:cNvPr id="2" name="Title 1"/>
+          <p:cNvSpPr>
+            <a:spLocks noGrp="1"/>
+          </p:cNvSpPr>
+          <p:nvPr>
+            <p:ph type="title"/>
+          </p:nvPr>
+        </p:nvSpPr>
+        <p:spPr/>
+        <p:txBody>
+          <a:bodyPr/>
+          <a:lstStyle/>
+          <a:p>
+            <a:r>
+              <a:rPr lang="en-US" dirty="0" smtClean="0"/>
+              <a:t>MONK Data</a:t>
+            </a:r>
+            <a:r>
+              <a:rPr lang="en-US" dirty="0" smtClean="0"/>
+              <a:t>: # of Iterations</a:t>
+            </a:r>
+            <a:endParaRPr lang="en-IN" dirty="0"/>
+          </a:p>
+        </p:txBody>
+      </p:sp>
+      <p:sp>
+        <p:nvSpPr>
+          <p:cNvPr id="5" name="Text Placeholder 4"/>
+          <p:cNvSpPr>
+            <a:spLocks noGrp="1"/>
+          </p:cNvSpPr>
+          <p:nvPr>
+            <p:ph type="body" idx="2"/>
+          </p:nvPr>
+        </p:nvSpPr>
+        <p:spPr/>
+        <p:txBody>
+          <a:bodyPr>
+            <a:normAutofit/>
+          </a:bodyPr>
+          <a:lstStyle/>
+          <a:p>
+            <a:r>
+              <a:rPr lang="en-US" sz="1800" dirty="0" smtClean="0"/>
+              <a:t>The graph represents the # of iterations taken for convergence of </a:t>
+            </a:r>
+            <a:r>
+              <a:rPr lang="en-US" sz="1800" dirty="0"/>
+              <a:t>MONK data sets ( MONK-1, MONK-2, MONK-3</a:t>
+            </a:r>
+            <a:r>
+              <a:rPr lang="en-US" sz="1800" dirty="0" smtClean="0"/>
+              <a:t>).</a:t>
+            </a:r>
+            <a:endParaRPr lang="en-US" sz="1800" dirty="0"/>
+          </a:p>
+        </p:txBody>
+      </p:sp>
+      <p:graphicFrame>
+        <p:nvGraphicFramePr>
+          <p:cNvPr id="4" name="Content Placeholder 3"/>
+          <p:cNvGraphicFramePr>
+            <a:graphicFrameLocks noGrp="1"/>
+          </p:cNvGraphicFramePr>
+          <p:nvPr>
+            <p:ph sz="quarter" idx="1"/>
+            <p:extLst>
+              <p:ext uri="{D42A27DB-BD31-4B8C-83A1-F6EECF244321}">
+                <p14:modId xmlns:p14="http://schemas.microsoft.com/office/powerpoint/2010/main" val="2067482812"/>
+              </p:ext>
+            </p:extLst>
+          </p:nvPr>
+        </p:nvGraphicFramePr>
+        <p:xfrm>
+          <a:off x="304800" y="304800"/>
+          <a:ext cx="5715000" cy="5715000"/>
+        </p:xfrm>
+        <a:graphic>
+          <a:graphicData uri="http://schemas.openxmlformats.org/drawingml/2006/chart">
+            <c:chart xmlns:c="http://schemas.openxmlformats.org/drawingml/2006/chart" xmlns:r="http://schemas.openxmlformats.org/officeDocument/2006/relationships" r:id="rId2"/>
+          </a:graphicData>
+        </a:graphic>
+      </p:graphicFrame>
+    </p:spTree>
+    <p:extLst>
+      <p:ext uri="{BB962C8B-B14F-4D97-AF65-F5344CB8AC3E}">
+        <p14:creationId xmlns:p14="http://schemas.microsoft.com/office/powerpoint/2010/main" val="3165554296"/>
+      </p:ext>
+    </p:extLst>
+  </p:cSld>
+  <p:clrMapOvr>
+    <a:masterClrMapping/>
+  </p:clrMapOvr>
+  <p:timing>
+    <p:tnLst>
+      <p:par>
+        <p:cTn id="1" dur="indefinite" restart="never" nodeType="tmRoot"/>
+      </p:par>
+    </p:tnLst>
+  </p:timing>
+</p:sld>
+</file>
+
 <file path=ppt/slides/slide4.xml><?xml version="1.0" encoding="utf-8"?>
 <p:sld xmlns:a="http://schemas.openxmlformats.org/drawingml/2006/main" xmlns:r="http://schemas.openxmlformats.org/officeDocument/2006/relationships" xmlns:p="http://schemas.openxmlformats.org/presentationml/2006/main">
   <p:cSld>

</xml_diff>